<commit_message>
removed necessity of being online.
also updated presentation
</commit_message>
<xml_diff>
--- a/Final Presentation.pptx
+++ b/Final Presentation.pptx
@@ -23,14 +23,21 @@
     <p:sldId id="272" r:id="rId17"/>
     <p:sldId id="273" r:id="rId18"/>
     <p:sldId id="274" r:id="rId19"/>
-    <p:sldId id="281" r:id="rId20"/>
-    <p:sldId id="275" r:id="rId21"/>
-    <p:sldId id="276" r:id="rId22"/>
-    <p:sldId id="277" r:id="rId23"/>
-    <p:sldId id="278" r:id="rId24"/>
-    <p:sldId id="279" r:id="rId25"/>
-    <p:sldId id="280" r:id="rId26"/>
-    <p:sldId id="282" r:id="rId27"/>
+    <p:sldId id="283" r:id="rId20"/>
+    <p:sldId id="281" r:id="rId21"/>
+    <p:sldId id="284" r:id="rId22"/>
+    <p:sldId id="285" r:id="rId23"/>
+    <p:sldId id="286" r:id="rId24"/>
+    <p:sldId id="275" r:id="rId25"/>
+    <p:sldId id="276" r:id="rId26"/>
+    <p:sldId id="277" r:id="rId27"/>
+    <p:sldId id="278" r:id="rId28"/>
+    <p:sldId id="279" r:id="rId29"/>
+    <p:sldId id="287" r:id="rId30"/>
+    <p:sldId id="288" r:id="rId31"/>
+    <p:sldId id="290" r:id="rId32"/>
+    <p:sldId id="289" r:id="rId33"/>
+    <p:sldId id="280" r:id="rId34"/>
   </p:sldIdLst>
   <p:sldSz cx="12192000" cy="6858000"/>
   <p:notesSz cx="6858000" cy="9144000"/>
@@ -1346,6 +1353,13 @@
         </dgm:presLayoutVars>
       </dgm:prSet>
       <dgm:spPr/>
+      <dgm:t>
+        <a:bodyPr/>
+        <a:lstStyle/>
+        <a:p>
+          <a:endParaRPr lang="en-US"/>
+        </a:p>
+      </dgm:t>
     </dgm:pt>
     <dgm:pt modelId="{A50C142B-38C3-44FD-AEA9-1E2D0A27DF5E}" type="pres">
       <dgm:prSet presAssocID="{ECD8AE38-2507-4D77-ACC8-708E41D2CC38}" presName="hierRoot1" presStyleCnt="0">
@@ -1377,6 +1391,13 @@
     <dgm:pt modelId="{354738EF-D378-448D-8473-DC4DF54C0CB0}" type="pres">
       <dgm:prSet presAssocID="{ECD8AE38-2507-4D77-ACC8-708E41D2CC38}" presName="rootConnector1" presStyleLbl="node1" presStyleIdx="0" presStyleCnt="0"/>
       <dgm:spPr/>
+      <dgm:t>
+        <a:bodyPr/>
+        <a:lstStyle/>
+        <a:p>
+          <a:endParaRPr lang="en-US"/>
+        </a:p>
+      </dgm:t>
     </dgm:pt>
     <dgm:pt modelId="{4906A8DB-C029-4019-A5A5-0BB9E69E90C2}" type="pres">
       <dgm:prSet presAssocID="{ECD8AE38-2507-4D77-ACC8-708E41D2CC38}" presName="hierChild2" presStyleCnt="0"/>
@@ -1385,6 +1406,13 @@
     <dgm:pt modelId="{61BDF8D2-7298-4DC9-B24B-E1E87334A52C}" type="pres">
       <dgm:prSet presAssocID="{0E7B2578-2563-4E2E-B96C-AAFE438BA7CC}" presName="Name37" presStyleLbl="parChTrans1D2" presStyleIdx="0" presStyleCnt="2"/>
       <dgm:spPr/>
+      <dgm:t>
+        <a:bodyPr/>
+        <a:lstStyle/>
+        <a:p>
+          <a:endParaRPr lang="en-US"/>
+        </a:p>
+      </dgm:t>
     </dgm:pt>
     <dgm:pt modelId="{835AD7AB-26C6-4DB9-B7FE-B0A2DF84C90D}" type="pres">
       <dgm:prSet presAssocID="{44A7776A-8B7D-4EEA-867E-145D596E53FA}" presName="hierRoot2" presStyleCnt="0">
@@ -1405,10 +1433,24 @@
         </dgm:presLayoutVars>
       </dgm:prSet>
       <dgm:spPr/>
+      <dgm:t>
+        <a:bodyPr/>
+        <a:lstStyle/>
+        <a:p>
+          <a:endParaRPr lang="en-US"/>
+        </a:p>
+      </dgm:t>
     </dgm:pt>
     <dgm:pt modelId="{ABC3790C-3173-4C58-9316-9E3FFADBB0A1}" type="pres">
       <dgm:prSet presAssocID="{44A7776A-8B7D-4EEA-867E-145D596E53FA}" presName="rootConnector" presStyleLbl="node2" presStyleIdx="0" presStyleCnt="2"/>
       <dgm:spPr/>
+      <dgm:t>
+        <a:bodyPr/>
+        <a:lstStyle/>
+        <a:p>
+          <a:endParaRPr lang="en-US"/>
+        </a:p>
+      </dgm:t>
     </dgm:pt>
     <dgm:pt modelId="{F69B2432-33AA-4DCE-BA49-F8AAB77D9475}" type="pres">
       <dgm:prSet presAssocID="{44A7776A-8B7D-4EEA-867E-145D596E53FA}" presName="hierChild4" presStyleCnt="0"/>
@@ -1417,6 +1459,13 @@
     <dgm:pt modelId="{D598CBDE-1F13-460F-88F3-86E182D3F05F}" type="pres">
       <dgm:prSet presAssocID="{B366009C-F11F-43F7-9C5E-5C53C368B66E}" presName="Name37" presStyleLbl="parChTrans1D3" presStyleIdx="0" presStyleCnt="5"/>
       <dgm:spPr/>
+      <dgm:t>
+        <a:bodyPr/>
+        <a:lstStyle/>
+        <a:p>
+          <a:endParaRPr lang="en-US"/>
+        </a:p>
+      </dgm:t>
     </dgm:pt>
     <dgm:pt modelId="{EBA1487B-ECFD-46C0-805B-0577057FA89E}" type="pres">
       <dgm:prSet presAssocID="{4FE72073-87F2-49D3-BB60-21AC8AD2BACA}" presName="hierRoot2" presStyleCnt="0">
@@ -1448,6 +1497,13 @@
     <dgm:pt modelId="{9A6CCAC9-4CB1-42F2-9D18-CED648A78E9D}" type="pres">
       <dgm:prSet presAssocID="{4FE72073-87F2-49D3-BB60-21AC8AD2BACA}" presName="rootConnector" presStyleLbl="node3" presStyleIdx="0" presStyleCnt="5"/>
       <dgm:spPr/>
+      <dgm:t>
+        <a:bodyPr/>
+        <a:lstStyle/>
+        <a:p>
+          <a:endParaRPr lang="en-US"/>
+        </a:p>
+      </dgm:t>
     </dgm:pt>
     <dgm:pt modelId="{B089D38D-80E9-406A-B759-F61297F2F9A3}" type="pres">
       <dgm:prSet presAssocID="{4FE72073-87F2-49D3-BB60-21AC8AD2BACA}" presName="hierChild4" presStyleCnt="0"/>
@@ -1456,6 +1512,13 @@
     <dgm:pt modelId="{37997045-4A33-41F8-8303-CA2EB5054D81}" type="pres">
       <dgm:prSet presAssocID="{CF691457-7C57-409A-9F6B-0EC884D1B29D}" presName="Name37" presStyleLbl="parChTrans1D4" presStyleIdx="0" presStyleCnt="3"/>
       <dgm:spPr/>
+      <dgm:t>
+        <a:bodyPr/>
+        <a:lstStyle/>
+        <a:p>
+          <a:endParaRPr lang="en-US"/>
+        </a:p>
+      </dgm:t>
     </dgm:pt>
     <dgm:pt modelId="{33BE5C24-6132-4B38-ACB5-6B6FDCAA54AD}" type="pres">
       <dgm:prSet presAssocID="{E691227B-B465-4669-8DB1-D65C9D809875}" presName="hierRoot2" presStyleCnt="0">
@@ -1487,6 +1550,13 @@
     <dgm:pt modelId="{D2ED5B10-721D-4634-BB4D-C22FCFE20B92}" type="pres">
       <dgm:prSet presAssocID="{E691227B-B465-4669-8DB1-D65C9D809875}" presName="rootConnector" presStyleLbl="node4" presStyleIdx="0" presStyleCnt="3"/>
       <dgm:spPr/>
+      <dgm:t>
+        <a:bodyPr/>
+        <a:lstStyle/>
+        <a:p>
+          <a:endParaRPr lang="en-US"/>
+        </a:p>
+      </dgm:t>
     </dgm:pt>
     <dgm:pt modelId="{A166B58D-C9BB-4F7C-9333-4199398A461C}" type="pres">
       <dgm:prSet presAssocID="{E691227B-B465-4669-8DB1-D65C9D809875}" presName="hierChild4" presStyleCnt="0"/>
@@ -1503,6 +1573,13 @@
     <dgm:pt modelId="{70552753-F892-484C-8ADF-FAF923D8CE30}" type="pres">
       <dgm:prSet presAssocID="{3258CBAC-7A1C-451E-AE16-718A125E86BD}" presName="Name37" presStyleLbl="parChTrans1D3" presStyleIdx="1" presStyleCnt="5"/>
       <dgm:spPr/>
+      <dgm:t>
+        <a:bodyPr/>
+        <a:lstStyle/>
+        <a:p>
+          <a:endParaRPr lang="en-US"/>
+        </a:p>
+      </dgm:t>
     </dgm:pt>
     <dgm:pt modelId="{C1EF8F36-4657-42A9-90FC-2B926CBCEFAC}" type="pres">
       <dgm:prSet presAssocID="{560A2498-4FA8-40E2-9E69-1DA41B9AD521}" presName="hierRoot2" presStyleCnt="0">
@@ -1523,10 +1600,24 @@
         </dgm:presLayoutVars>
       </dgm:prSet>
       <dgm:spPr/>
+      <dgm:t>
+        <a:bodyPr/>
+        <a:lstStyle/>
+        <a:p>
+          <a:endParaRPr lang="en-US"/>
+        </a:p>
+      </dgm:t>
     </dgm:pt>
     <dgm:pt modelId="{485B7185-41F0-4D2D-BB75-9D8A50A5FA92}" type="pres">
       <dgm:prSet presAssocID="{560A2498-4FA8-40E2-9E69-1DA41B9AD521}" presName="rootConnector" presStyleLbl="node3" presStyleIdx="1" presStyleCnt="5"/>
       <dgm:spPr/>
+      <dgm:t>
+        <a:bodyPr/>
+        <a:lstStyle/>
+        <a:p>
+          <a:endParaRPr lang="en-US"/>
+        </a:p>
+      </dgm:t>
     </dgm:pt>
     <dgm:pt modelId="{BE10315F-D168-4399-BD01-D9F6A3A7F872}" type="pres">
       <dgm:prSet presAssocID="{560A2498-4FA8-40E2-9E69-1DA41B9AD521}" presName="hierChild4" presStyleCnt="0"/>
@@ -1535,6 +1626,13 @@
     <dgm:pt modelId="{F9D821C8-B0CC-4B0A-BD5E-D7FCA092AFEC}" type="pres">
       <dgm:prSet presAssocID="{7ACC1E73-587D-466F-82B3-7A1E2C398467}" presName="Name37" presStyleLbl="parChTrans1D4" presStyleIdx="1" presStyleCnt="3"/>
       <dgm:spPr/>
+      <dgm:t>
+        <a:bodyPr/>
+        <a:lstStyle/>
+        <a:p>
+          <a:endParaRPr lang="en-US"/>
+        </a:p>
+      </dgm:t>
     </dgm:pt>
     <dgm:pt modelId="{0CC41525-3CC2-4628-9C7A-6A87C9BEF6B3}" type="pres">
       <dgm:prSet presAssocID="{470511EE-D208-4BEA-B0B1-C7383C13E5E4}" presName="hierRoot2" presStyleCnt="0">
@@ -1566,6 +1664,13 @@
     <dgm:pt modelId="{A0B21C92-6A5D-4A61-9FCD-935810D29247}" type="pres">
       <dgm:prSet presAssocID="{470511EE-D208-4BEA-B0B1-C7383C13E5E4}" presName="rootConnector" presStyleLbl="node4" presStyleIdx="1" presStyleCnt="3"/>
       <dgm:spPr/>
+      <dgm:t>
+        <a:bodyPr/>
+        <a:lstStyle/>
+        <a:p>
+          <a:endParaRPr lang="en-US"/>
+        </a:p>
+      </dgm:t>
     </dgm:pt>
     <dgm:pt modelId="{5463AB42-C2E1-4966-B70B-365E2071A5AE}" type="pres">
       <dgm:prSet presAssocID="{470511EE-D208-4BEA-B0B1-C7383C13E5E4}" presName="hierChild4" presStyleCnt="0"/>
@@ -1582,6 +1687,13 @@
     <dgm:pt modelId="{EE9D595B-F20D-497D-B6FD-9C56A2480F7F}" type="pres">
       <dgm:prSet presAssocID="{F745B2AB-5E04-461C-8693-33B31584D5A1}" presName="Name37" presStyleLbl="parChTrans1D3" presStyleIdx="2" presStyleCnt="5"/>
       <dgm:spPr/>
+      <dgm:t>
+        <a:bodyPr/>
+        <a:lstStyle/>
+        <a:p>
+          <a:endParaRPr lang="en-US"/>
+        </a:p>
+      </dgm:t>
     </dgm:pt>
     <dgm:pt modelId="{9D9115C4-C40B-4E0D-9EE3-AE7A1D2B78AC}" type="pres">
       <dgm:prSet presAssocID="{164A63FD-52B7-41B8-8FD1-D783C9114C9B}" presName="hierRoot2" presStyleCnt="0">
@@ -1613,6 +1725,13 @@
     <dgm:pt modelId="{073B3470-7FAD-4A2B-B88F-A490B349B746}" type="pres">
       <dgm:prSet presAssocID="{164A63FD-52B7-41B8-8FD1-D783C9114C9B}" presName="rootConnector" presStyleLbl="node3" presStyleIdx="2" presStyleCnt="5"/>
       <dgm:spPr/>
+      <dgm:t>
+        <a:bodyPr/>
+        <a:lstStyle/>
+        <a:p>
+          <a:endParaRPr lang="en-US"/>
+        </a:p>
+      </dgm:t>
     </dgm:pt>
     <dgm:pt modelId="{401399DB-123E-424D-A078-D64C878BAC71}" type="pres">
       <dgm:prSet presAssocID="{164A63FD-52B7-41B8-8FD1-D783C9114C9B}" presName="hierChild4" presStyleCnt="0"/>
@@ -1621,6 +1740,13 @@
     <dgm:pt modelId="{5CDFF7C4-1CB5-435B-8D92-FC7156893207}" type="pres">
       <dgm:prSet presAssocID="{42B1BD90-C05C-4E22-BAF6-B010D850747E}" presName="Name37" presStyleLbl="parChTrans1D4" presStyleIdx="2" presStyleCnt="3"/>
       <dgm:spPr/>
+      <dgm:t>
+        <a:bodyPr/>
+        <a:lstStyle/>
+        <a:p>
+          <a:endParaRPr lang="en-US"/>
+        </a:p>
+      </dgm:t>
     </dgm:pt>
     <dgm:pt modelId="{80CCC02F-FE53-4277-8FD9-7E1D1076282B}" type="pres">
       <dgm:prSet presAssocID="{6A846C01-EE80-4B52-B9C5-59535959553D}" presName="hierRoot2" presStyleCnt="0">
@@ -1652,6 +1778,13 @@
     <dgm:pt modelId="{1B061F40-C420-42AD-951A-9D8F2BF9D8B8}" type="pres">
       <dgm:prSet presAssocID="{6A846C01-EE80-4B52-B9C5-59535959553D}" presName="rootConnector" presStyleLbl="node4" presStyleIdx="2" presStyleCnt="3"/>
       <dgm:spPr/>
+      <dgm:t>
+        <a:bodyPr/>
+        <a:lstStyle/>
+        <a:p>
+          <a:endParaRPr lang="en-US"/>
+        </a:p>
+      </dgm:t>
     </dgm:pt>
     <dgm:pt modelId="{C862CF39-4048-400D-81D5-5FDA05D59322}" type="pres">
       <dgm:prSet presAssocID="{6A846C01-EE80-4B52-B9C5-59535959553D}" presName="hierChild4" presStyleCnt="0"/>
@@ -1672,6 +1805,13 @@
     <dgm:pt modelId="{46CE8EA9-48D4-4BCB-AC2A-6BAC563F3CE5}" type="pres">
       <dgm:prSet presAssocID="{D58FFBF9-FD75-4008-A1AA-BFA4C232754A}" presName="Name37" presStyleLbl="parChTrans1D2" presStyleIdx="1" presStyleCnt="2"/>
       <dgm:spPr/>
+      <dgm:t>
+        <a:bodyPr/>
+        <a:lstStyle/>
+        <a:p>
+          <a:endParaRPr lang="en-US"/>
+        </a:p>
+      </dgm:t>
     </dgm:pt>
     <dgm:pt modelId="{75EA9201-3610-4AC7-A53F-A216B4E889D9}" type="pres">
       <dgm:prSet presAssocID="{AC05D588-6CAB-4315-A480-DC0EDF3465C0}" presName="hierRoot2" presStyleCnt="0">
@@ -1703,6 +1843,13 @@
     <dgm:pt modelId="{B60366E3-7C78-4560-B359-3FCB33F0C5FE}" type="pres">
       <dgm:prSet presAssocID="{AC05D588-6CAB-4315-A480-DC0EDF3465C0}" presName="rootConnector" presStyleLbl="node2" presStyleIdx="1" presStyleCnt="2"/>
       <dgm:spPr/>
+      <dgm:t>
+        <a:bodyPr/>
+        <a:lstStyle/>
+        <a:p>
+          <a:endParaRPr lang="en-US"/>
+        </a:p>
+      </dgm:t>
     </dgm:pt>
     <dgm:pt modelId="{A7CDD92D-0484-46DD-860C-F31BBCFC891A}" type="pres">
       <dgm:prSet presAssocID="{AC05D588-6CAB-4315-A480-DC0EDF3465C0}" presName="hierChild4" presStyleCnt="0"/>
@@ -1711,6 +1858,13 @@
     <dgm:pt modelId="{4879CA08-1223-4E9D-915F-2FC323AE0816}" type="pres">
       <dgm:prSet presAssocID="{1CB4FF75-8ED9-4EF6-A67C-136E089279F1}" presName="Name37" presStyleLbl="parChTrans1D3" presStyleIdx="3" presStyleCnt="5"/>
       <dgm:spPr/>
+      <dgm:t>
+        <a:bodyPr/>
+        <a:lstStyle/>
+        <a:p>
+          <a:endParaRPr lang="en-US"/>
+        </a:p>
+      </dgm:t>
     </dgm:pt>
     <dgm:pt modelId="{C54AFB15-88E6-471C-B83F-98E7B3689530}" type="pres">
       <dgm:prSet presAssocID="{7800C4E9-60AC-45A6-A713-ED9A99DE68DF}" presName="hierRoot2" presStyleCnt="0">
@@ -1742,6 +1896,13 @@
     <dgm:pt modelId="{CE571024-4671-45F2-9BCD-C14C25856AA3}" type="pres">
       <dgm:prSet presAssocID="{7800C4E9-60AC-45A6-A713-ED9A99DE68DF}" presName="rootConnector" presStyleLbl="node3" presStyleIdx="3" presStyleCnt="5"/>
       <dgm:spPr/>
+      <dgm:t>
+        <a:bodyPr/>
+        <a:lstStyle/>
+        <a:p>
+          <a:endParaRPr lang="en-US"/>
+        </a:p>
+      </dgm:t>
     </dgm:pt>
     <dgm:pt modelId="{52D8C098-E42D-4338-B383-42638F311691}" type="pres">
       <dgm:prSet presAssocID="{7800C4E9-60AC-45A6-A713-ED9A99DE68DF}" presName="hierChild4" presStyleCnt="0"/>
@@ -1754,6 +1915,13 @@
     <dgm:pt modelId="{14366BED-FF36-4D1B-BE58-2D837331A10C}" type="pres">
       <dgm:prSet presAssocID="{0609CC73-6F1D-4483-B9D1-EDCCB2EB157B}" presName="Name37" presStyleLbl="parChTrans1D3" presStyleIdx="4" presStyleCnt="5"/>
       <dgm:spPr/>
+      <dgm:t>
+        <a:bodyPr/>
+        <a:lstStyle/>
+        <a:p>
+          <a:endParaRPr lang="en-US"/>
+        </a:p>
+      </dgm:t>
     </dgm:pt>
     <dgm:pt modelId="{7118EC0D-8409-4CDA-B8BF-F53C4408CE37}" type="pres">
       <dgm:prSet presAssocID="{22CE5E4B-9806-4205-AAD6-8E7B8BECDDB5}" presName="hierRoot2" presStyleCnt="0">
@@ -1774,10 +1942,24 @@
         </dgm:presLayoutVars>
       </dgm:prSet>
       <dgm:spPr/>
+      <dgm:t>
+        <a:bodyPr/>
+        <a:lstStyle/>
+        <a:p>
+          <a:endParaRPr lang="en-US"/>
+        </a:p>
+      </dgm:t>
     </dgm:pt>
     <dgm:pt modelId="{E73A4FD3-6C88-4FBD-9EDD-78DDA8798AD4}" type="pres">
       <dgm:prSet presAssocID="{22CE5E4B-9806-4205-AAD6-8E7B8BECDDB5}" presName="rootConnector" presStyleLbl="node3" presStyleIdx="4" presStyleCnt="5"/>
       <dgm:spPr/>
+      <dgm:t>
+        <a:bodyPr/>
+        <a:lstStyle/>
+        <a:p>
+          <a:endParaRPr lang="en-US"/>
+        </a:p>
+      </dgm:t>
     </dgm:pt>
     <dgm:pt modelId="{CD5A0568-D2DF-47C5-B87C-45A5A2AF811D}" type="pres">
       <dgm:prSet presAssocID="{22CE5E4B-9806-4205-AAD6-8E7B8BECDDB5}" presName="hierChild4" presStyleCnt="0"/>
@@ -1797,50 +1979,50 @@
     </dgm:pt>
   </dgm:ptLst>
   <dgm:cxnLst>
+    <dgm:cxn modelId="{5161F01C-8D59-4384-BDE4-165E074BF83A}" type="presOf" srcId="{0609CC73-6F1D-4483-B9D1-EDCCB2EB157B}" destId="{14366BED-FF36-4D1B-BE58-2D837331A10C}" srcOrd="0" destOrd="0" presId="urn:microsoft.com/office/officeart/2005/8/layout/orgChart1"/>
+    <dgm:cxn modelId="{CFD0CCE7-77B9-4C9C-8F98-948FA60FAA4C}" type="presOf" srcId="{560A2498-4FA8-40E2-9E69-1DA41B9AD521}" destId="{F93F34D8-1ED5-4397-940C-31CEB3387FC2}" srcOrd="0" destOrd="0" presId="urn:microsoft.com/office/officeart/2005/8/layout/orgChart1"/>
+    <dgm:cxn modelId="{6AAF2D01-A441-4834-B498-56E12C31077D}" type="presOf" srcId="{4FE72073-87F2-49D3-BB60-21AC8AD2BACA}" destId="{F8634641-38D6-4A04-8F81-40CF3D183929}" srcOrd="0" destOrd="0" presId="urn:microsoft.com/office/officeart/2005/8/layout/orgChart1"/>
+    <dgm:cxn modelId="{0FAD8E1A-ECBF-4EB4-B8E1-56E41A07CE30}" type="presOf" srcId="{560A2498-4FA8-40E2-9E69-1DA41B9AD521}" destId="{485B7185-41F0-4D2D-BB75-9D8A50A5FA92}" srcOrd="1" destOrd="0" presId="urn:microsoft.com/office/officeart/2005/8/layout/orgChart1"/>
+    <dgm:cxn modelId="{3992A9D2-F1B2-411B-841C-7E67058A2A56}" type="presOf" srcId="{AC05D588-6CAB-4315-A480-DC0EDF3465C0}" destId="{E11FDF21-ABDA-4873-AD0F-D2120EC186B1}" srcOrd="0" destOrd="0" presId="urn:microsoft.com/office/officeart/2005/8/layout/orgChart1"/>
+    <dgm:cxn modelId="{7B323717-0035-4730-9CEF-739629A8FBE6}" type="presOf" srcId="{0E7B2578-2563-4E2E-B96C-AAFE438BA7CC}" destId="{61BDF8D2-7298-4DC9-B24B-E1E87334A52C}" srcOrd="0" destOrd="0" presId="urn:microsoft.com/office/officeart/2005/8/layout/orgChart1"/>
+    <dgm:cxn modelId="{619FC0F7-BAB9-4727-B688-D222DC3E60A6}" srcId="{44A7776A-8B7D-4EEA-867E-145D596E53FA}" destId="{4FE72073-87F2-49D3-BB60-21AC8AD2BACA}" srcOrd="0" destOrd="0" parTransId="{B366009C-F11F-43F7-9C5E-5C53C368B66E}" sibTransId="{A1E0BB01-E0D2-431A-A41C-97409BC853BC}"/>
+    <dgm:cxn modelId="{73E8F912-8366-4888-9B46-D1D0A5D2C764}" type="presOf" srcId="{AC05D588-6CAB-4315-A480-DC0EDF3465C0}" destId="{B60366E3-7C78-4560-B359-3FCB33F0C5FE}" srcOrd="1" destOrd="0" presId="urn:microsoft.com/office/officeart/2005/8/layout/orgChart1"/>
+    <dgm:cxn modelId="{EF9FC286-AF36-4E69-9790-99FBB4887B5E}" srcId="{164A63FD-52B7-41B8-8FD1-D783C9114C9B}" destId="{6A846C01-EE80-4B52-B9C5-59535959553D}" srcOrd="0" destOrd="0" parTransId="{42B1BD90-C05C-4E22-BAF6-B010D850747E}" sibTransId="{9E35A7ED-1A3B-4A2C-82FB-D046DA8F4FAB}"/>
+    <dgm:cxn modelId="{41AE0932-A86D-4F66-BEE4-9891D8CFF579}" type="presOf" srcId="{44A7776A-8B7D-4EEA-867E-145D596E53FA}" destId="{23BA6D37-5699-453D-9039-4D32172A7167}" srcOrd="0" destOrd="0" presId="urn:microsoft.com/office/officeart/2005/8/layout/orgChart1"/>
+    <dgm:cxn modelId="{C0432A1C-699B-48E7-B6DA-EB7D5C344497}" srcId="{44A7776A-8B7D-4EEA-867E-145D596E53FA}" destId="{164A63FD-52B7-41B8-8FD1-D783C9114C9B}" srcOrd="2" destOrd="0" parTransId="{F745B2AB-5E04-461C-8693-33B31584D5A1}" sibTransId="{7F222700-4E6C-4E42-8AFE-202B24B7F808}"/>
+    <dgm:cxn modelId="{FD0BC65D-15EA-4FEC-9E6F-821E6D621736}" type="presOf" srcId="{E691227B-B465-4669-8DB1-D65C9D809875}" destId="{27615001-C90D-4798-97D7-8F54D9DF7617}" srcOrd="0" destOrd="0" presId="urn:microsoft.com/office/officeart/2005/8/layout/orgChart1"/>
+    <dgm:cxn modelId="{CF3B0A68-8A09-4EFC-B4AD-7ACD2C3917F6}" srcId="{6CF80A5F-AE3B-4C22-9DB5-D99880319B4A}" destId="{ECD8AE38-2507-4D77-ACC8-708E41D2CC38}" srcOrd="0" destOrd="0" parTransId="{39E87826-4C75-493F-8CC6-886BE1F12103}" sibTransId="{81049027-2D5C-4764-882D-7130BE7488B6}"/>
+    <dgm:cxn modelId="{44F28508-71C9-409F-8A4B-5A9D3D815511}" type="presOf" srcId="{E691227B-B465-4669-8DB1-D65C9D809875}" destId="{D2ED5B10-721D-4634-BB4D-C22FCFE20B92}" srcOrd="1" destOrd="0" presId="urn:microsoft.com/office/officeart/2005/8/layout/orgChart1"/>
     <dgm:cxn modelId="{BEC9C1B7-65CE-45B7-B3BE-8DBE22207056}" type="presOf" srcId="{22CE5E4B-9806-4205-AAD6-8E7B8BECDDB5}" destId="{48D65267-BDA7-4776-A4B4-BEC32671358B}" srcOrd="0" destOrd="0" presId="urn:microsoft.com/office/officeart/2005/8/layout/orgChart1"/>
-    <dgm:cxn modelId="{619FC0F7-BAB9-4727-B688-D222DC3E60A6}" srcId="{44A7776A-8B7D-4EEA-867E-145D596E53FA}" destId="{4FE72073-87F2-49D3-BB60-21AC8AD2BACA}" srcOrd="0" destOrd="0" parTransId="{B366009C-F11F-43F7-9C5E-5C53C368B66E}" sibTransId="{A1E0BB01-E0D2-431A-A41C-97409BC853BC}"/>
-    <dgm:cxn modelId="{41AE0932-A86D-4F66-BEE4-9891D8CFF579}" type="presOf" srcId="{44A7776A-8B7D-4EEA-867E-145D596E53FA}" destId="{23BA6D37-5699-453D-9039-4D32172A7167}" srcOrd="0" destOrd="0" presId="urn:microsoft.com/office/officeart/2005/8/layout/orgChart1"/>
+    <dgm:cxn modelId="{CF8A9E72-2E5B-4D48-AD4F-3ABFA2648F90}" type="presOf" srcId="{3258CBAC-7A1C-451E-AE16-718A125E86BD}" destId="{70552753-F892-484C-8ADF-FAF923D8CE30}" srcOrd="0" destOrd="0" presId="urn:microsoft.com/office/officeart/2005/8/layout/orgChart1"/>
+    <dgm:cxn modelId="{07A9C373-E77A-44A6-8B81-B17DF5492907}" type="presOf" srcId="{6CF80A5F-AE3B-4C22-9DB5-D99880319B4A}" destId="{F157BA3F-8B20-4116-A18A-54C82ACB553F}" srcOrd="0" destOrd="0" presId="urn:microsoft.com/office/officeart/2005/8/layout/orgChart1"/>
+    <dgm:cxn modelId="{E0F5E952-6A33-4E87-B779-72C1E157125F}" type="presOf" srcId="{F745B2AB-5E04-461C-8693-33B31584D5A1}" destId="{EE9D595B-F20D-497D-B6FD-9C56A2480F7F}" srcOrd="0" destOrd="0" presId="urn:microsoft.com/office/officeart/2005/8/layout/orgChart1"/>
+    <dgm:cxn modelId="{3E8B9271-A2A2-472F-B41C-A6F2D822A12A}" srcId="{4FE72073-87F2-49D3-BB60-21AC8AD2BACA}" destId="{E691227B-B465-4669-8DB1-D65C9D809875}" srcOrd="0" destOrd="0" parTransId="{CF691457-7C57-409A-9F6B-0EC884D1B29D}" sibTransId="{BC48CC3F-5664-4D55-98B3-2ADD69CD67FB}"/>
+    <dgm:cxn modelId="{F80BE0E8-BFF8-4377-8350-32F63AE56B6A}" type="presOf" srcId="{22CE5E4B-9806-4205-AAD6-8E7B8BECDDB5}" destId="{E73A4FD3-6C88-4FBD-9EDD-78DDA8798AD4}" srcOrd="1" destOrd="0" presId="urn:microsoft.com/office/officeart/2005/8/layout/orgChart1"/>
+    <dgm:cxn modelId="{9727C294-1AA7-4F70-862E-FDF4E687B912}" srcId="{ECD8AE38-2507-4D77-ACC8-708E41D2CC38}" destId="{44A7776A-8B7D-4EEA-867E-145D596E53FA}" srcOrd="0" destOrd="0" parTransId="{0E7B2578-2563-4E2E-B96C-AAFE438BA7CC}" sibTransId="{77ED911C-FF4B-4656-855D-75B940C9B4FC}"/>
+    <dgm:cxn modelId="{6EBE264C-4A85-444A-845E-73AF96C07B2A}" type="presOf" srcId="{B366009C-F11F-43F7-9C5E-5C53C368B66E}" destId="{D598CBDE-1F13-460F-88F3-86E182D3F05F}" srcOrd="0" destOrd="0" presId="urn:microsoft.com/office/officeart/2005/8/layout/orgChart1"/>
+    <dgm:cxn modelId="{F8214F18-F959-4E7C-8B5A-45F49A85D8D0}" type="presOf" srcId="{7ACC1E73-587D-466F-82B3-7A1E2C398467}" destId="{F9D821C8-B0CC-4B0A-BD5E-D7FCA092AFEC}" srcOrd="0" destOrd="0" presId="urn:microsoft.com/office/officeart/2005/8/layout/orgChart1"/>
+    <dgm:cxn modelId="{50894702-47DA-488F-9C7B-2CB8DD6E930A}" srcId="{44A7776A-8B7D-4EEA-867E-145D596E53FA}" destId="{560A2498-4FA8-40E2-9E69-1DA41B9AD521}" srcOrd="1" destOrd="0" parTransId="{3258CBAC-7A1C-451E-AE16-718A125E86BD}" sibTransId="{F9590B73-4FC2-40BE-ACCF-4EB2DD7466E4}"/>
+    <dgm:cxn modelId="{90FEDD1B-1CE2-423D-A2EF-2058867D95E7}" type="presOf" srcId="{ECD8AE38-2507-4D77-ACC8-708E41D2CC38}" destId="{354738EF-D378-448D-8473-DC4DF54C0CB0}" srcOrd="1" destOrd="0" presId="urn:microsoft.com/office/officeart/2005/8/layout/orgChart1"/>
+    <dgm:cxn modelId="{B2E8EBDD-2044-4FB1-9ECC-FA58FE1C1BB0}" type="presOf" srcId="{164A63FD-52B7-41B8-8FD1-D783C9114C9B}" destId="{1AD14AB7-2AEA-4B7B-921B-60407B96DD0B}" srcOrd="0" destOrd="0" presId="urn:microsoft.com/office/officeart/2005/8/layout/orgChart1"/>
+    <dgm:cxn modelId="{32BA0F0E-A2D8-400D-A1C9-E18249709052}" type="presOf" srcId="{7800C4E9-60AC-45A6-A713-ED9A99DE68DF}" destId="{2045300A-02B9-4CE0-A6F1-374E3251FEAE}" srcOrd="0" destOrd="0" presId="urn:microsoft.com/office/officeart/2005/8/layout/orgChart1"/>
+    <dgm:cxn modelId="{C3FC7A1A-5D90-4F3A-87F0-203AAA8145E6}" type="presOf" srcId="{42B1BD90-C05C-4E22-BAF6-B010D850747E}" destId="{5CDFF7C4-1CB5-435B-8D92-FC7156893207}" srcOrd="0" destOrd="0" presId="urn:microsoft.com/office/officeart/2005/8/layout/orgChart1"/>
+    <dgm:cxn modelId="{A48E8B8C-8449-4ED3-A093-FA570F343D04}" type="presOf" srcId="{ECD8AE38-2507-4D77-ACC8-708E41D2CC38}" destId="{0BA20DC5-2B68-48AD-BC31-110E92094059}" srcOrd="0" destOrd="0" presId="urn:microsoft.com/office/officeart/2005/8/layout/orgChart1"/>
+    <dgm:cxn modelId="{433E3D16-F697-4E1E-A866-6BD0D1533F7A}" type="presOf" srcId="{4FE72073-87F2-49D3-BB60-21AC8AD2BACA}" destId="{9A6CCAC9-4CB1-42F2-9D18-CED648A78E9D}" srcOrd="1" destOrd="0" presId="urn:microsoft.com/office/officeart/2005/8/layout/orgChart1"/>
+    <dgm:cxn modelId="{519EF8D0-ECBF-4F82-A4F1-7B2310E22129}" type="presOf" srcId="{470511EE-D208-4BEA-B0B1-C7383C13E5E4}" destId="{A0B21C92-6A5D-4A61-9FCD-935810D29247}" srcOrd="1" destOrd="0" presId="urn:microsoft.com/office/officeart/2005/8/layout/orgChart1"/>
     <dgm:cxn modelId="{8ABB56D4-6651-49A0-B09D-ABB5A1A7DA6F}" srcId="{AC05D588-6CAB-4315-A480-DC0EDF3465C0}" destId="{22CE5E4B-9806-4205-AAD6-8E7B8BECDDB5}" srcOrd="1" destOrd="0" parTransId="{0609CC73-6F1D-4483-B9D1-EDCCB2EB157B}" sibTransId="{2C8009A2-F35C-4B44-8363-6F6B4851D38B}"/>
-    <dgm:cxn modelId="{90FEDD1B-1CE2-423D-A2EF-2058867D95E7}" type="presOf" srcId="{ECD8AE38-2507-4D77-ACC8-708E41D2CC38}" destId="{354738EF-D378-448D-8473-DC4DF54C0CB0}" srcOrd="1" destOrd="0" presId="urn:microsoft.com/office/officeart/2005/8/layout/orgChart1"/>
+    <dgm:cxn modelId="{1F135B92-91B7-4574-9B8C-C6EC6C6F6750}" type="presOf" srcId="{7800C4E9-60AC-45A6-A713-ED9A99DE68DF}" destId="{CE571024-4671-45F2-9BCD-C14C25856AA3}" srcOrd="1" destOrd="0" presId="urn:microsoft.com/office/officeart/2005/8/layout/orgChart1"/>
+    <dgm:cxn modelId="{BA8548A8-3989-4D76-B533-27D2F8F22F54}" srcId="{ECD8AE38-2507-4D77-ACC8-708E41D2CC38}" destId="{AC05D588-6CAB-4315-A480-DC0EDF3465C0}" srcOrd="1" destOrd="0" parTransId="{D58FFBF9-FD75-4008-A1AA-BFA4C232754A}" sibTransId="{348CDE5B-7438-450A-A4C5-6465AECF7853}"/>
+    <dgm:cxn modelId="{DFBDB771-4811-4743-86D5-742E2BEFDEEF}" type="presOf" srcId="{D58FFBF9-FD75-4008-A1AA-BFA4C232754A}" destId="{46CE8EA9-48D4-4BCB-AC2A-6BAC563F3CE5}" srcOrd="0" destOrd="0" presId="urn:microsoft.com/office/officeart/2005/8/layout/orgChart1"/>
+    <dgm:cxn modelId="{45BD869E-947F-401C-B324-68E1473CD5E8}" type="presOf" srcId="{1CB4FF75-8ED9-4EF6-A67C-136E089279F1}" destId="{4879CA08-1223-4E9D-915F-2FC323AE0816}" srcOrd="0" destOrd="0" presId="urn:microsoft.com/office/officeart/2005/8/layout/orgChart1"/>
+    <dgm:cxn modelId="{274B8763-FC35-475B-9157-3409FC9C874F}" type="presOf" srcId="{CF691457-7C57-409A-9F6B-0EC884D1B29D}" destId="{37997045-4A33-41F8-8303-CA2EB5054D81}" srcOrd="0" destOrd="0" presId="urn:microsoft.com/office/officeart/2005/8/layout/orgChart1"/>
     <dgm:cxn modelId="{E91E890F-AE2D-4F7A-A1BF-A1E84BFB1511}" srcId="{AC05D588-6CAB-4315-A480-DC0EDF3465C0}" destId="{7800C4E9-60AC-45A6-A713-ED9A99DE68DF}" srcOrd="0" destOrd="0" parTransId="{1CB4FF75-8ED9-4EF6-A67C-136E089279F1}" sibTransId="{F56FFC99-B0E8-4D01-90AA-A4DEB45CB4B1}"/>
-    <dgm:cxn modelId="{6AAF2D01-A441-4834-B498-56E12C31077D}" type="presOf" srcId="{4FE72073-87F2-49D3-BB60-21AC8AD2BACA}" destId="{F8634641-38D6-4A04-8F81-40CF3D183929}" srcOrd="0" destOrd="0" presId="urn:microsoft.com/office/officeart/2005/8/layout/orgChart1"/>
-    <dgm:cxn modelId="{DFBDB771-4811-4743-86D5-742E2BEFDEEF}" type="presOf" srcId="{D58FFBF9-FD75-4008-A1AA-BFA4C232754A}" destId="{46CE8EA9-48D4-4BCB-AC2A-6BAC563F3CE5}" srcOrd="0" destOrd="0" presId="urn:microsoft.com/office/officeart/2005/8/layout/orgChart1"/>
-    <dgm:cxn modelId="{07A9C373-E77A-44A6-8B81-B17DF5492907}" type="presOf" srcId="{6CF80A5F-AE3B-4C22-9DB5-D99880319B4A}" destId="{F157BA3F-8B20-4116-A18A-54C82ACB553F}" srcOrd="0" destOrd="0" presId="urn:microsoft.com/office/officeart/2005/8/layout/orgChart1"/>
-    <dgm:cxn modelId="{F8214F18-F959-4E7C-8B5A-45F49A85D8D0}" type="presOf" srcId="{7ACC1E73-587D-466F-82B3-7A1E2C398467}" destId="{F9D821C8-B0CC-4B0A-BD5E-D7FCA092AFEC}" srcOrd="0" destOrd="0" presId="urn:microsoft.com/office/officeart/2005/8/layout/orgChart1"/>
+    <dgm:cxn modelId="{5FC07903-09B8-425C-8E7C-B7DED5273C7B}" srcId="{560A2498-4FA8-40E2-9E69-1DA41B9AD521}" destId="{470511EE-D208-4BEA-B0B1-C7383C13E5E4}" srcOrd="0" destOrd="0" parTransId="{7ACC1E73-587D-466F-82B3-7A1E2C398467}" sibTransId="{DF0A0F1C-A3CD-462F-A569-57E1649C7679}"/>
+    <dgm:cxn modelId="{9BAC8A9B-F028-4EDC-A31A-5733EA86DA2F}" type="presOf" srcId="{6A846C01-EE80-4B52-B9C5-59535959553D}" destId="{CB98D7D8-64D0-4343-BBB5-FC48AA48F504}" srcOrd="0" destOrd="0" presId="urn:microsoft.com/office/officeart/2005/8/layout/orgChart1"/>
+    <dgm:cxn modelId="{6BA4205D-0219-4B9D-A347-A124EA9A7A50}" type="presOf" srcId="{164A63FD-52B7-41B8-8FD1-D783C9114C9B}" destId="{073B3470-7FAD-4A2B-B88F-A490B349B746}" srcOrd="1" destOrd="0" presId="urn:microsoft.com/office/officeart/2005/8/layout/orgChart1"/>
+    <dgm:cxn modelId="{4A30AB42-8159-4FE7-9BA1-F725F0AE7942}" type="presOf" srcId="{6A846C01-EE80-4B52-B9C5-59535959553D}" destId="{1B061F40-C420-42AD-951A-9D8F2BF9D8B8}" srcOrd="1" destOrd="0" presId="urn:microsoft.com/office/officeart/2005/8/layout/orgChart1"/>
     <dgm:cxn modelId="{62D1EC75-20B6-49F4-9D6E-505F49554743}" type="presOf" srcId="{470511EE-D208-4BEA-B0B1-C7383C13E5E4}" destId="{EEC8906C-5A69-4550-A4F7-FB9EDAC09D3D}" srcOrd="0" destOrd="0" presId="urn:microsoft.com/office/officeart/2005/8/layout/orgChart1"/>
-    <dgm:cxn modelId="{6EBE264C-4A85-444A-845E-73AF96C07B2A}" type="presOf" srcId="{B366009C-F11F-43F7-9C5E-5C53C368B66E}" destId="{D598CBDE-1F13-460F-88F3-86E182D3F05F}" srcOrd="0" destOrd="0" presId="urn:microsoft.com/office/officeart/2005/8/layout/orgChart1"/>
-    <dgm:cxn modelId="{CF8A9E72-2E5B-4D48-AD4F-3ABFA2648F90}" type="presOf" srcId="{3258CBAC-7A1C-451E-AE16-718A125E86BD}" destId="{70552753-F892-484C-8ADF-FAF923D8CE30}" srcOrd="0" destOrd="0" presId="urn:microsoft.com/office/officeart/2005/8/layout/orgChart1"/>
-    <dgm:cxn modelId="{BA8548A8-3989-4D76-B533-27D2F8F22F54}" srcId="{ECD8AE38-2507-4D77-ACC8-708E41D2CC38}" destId="{AC05D588-6CAB-4315-A480-DC0EDF3465C0}" srcOrd="1" destOrd="0" parTransId="{D58FFBF9-FD75-4008-A1AA-BFA4C232754A}" sibTransId="{348CDE5B-7438-450A-A4C5-6465AECF7853}"/>
-    <dgm:cxn modelId="{45BD869E-947F-401C-B324-68E1473CD5E8}" type="presOf" srcId="{1CB4FF75-8ED9-4EF6-A67C-136E089279F1}" destId="{4879CA08-1223-4E9D-915F-2FC323AE0816}" srcOrd="0" destOrd="0" presId="urn:microsoft.com/office/officeart/2005/8/layout/orgChart1"/>
-    <dgm:cxn modelId="{CF3B0A68-8A09-4EFC-B4AD-7ACD2C3917F6}" srcId="{6CF80A5F-AE3B-4C22-9DB5-D99880319B4A}" destId="{ECD8AE38-2507-4D77-ACC8-708E41D2CC38}" srcOrd="0" destOrd="0" parTransId="{39E87826-4C75-493F-8CC6-886BE1F12103}" sibTransId="{81049027-2D5C-4764-882D-7130BE7488B6}"/>
-    <dgm:cxn modelId="{3E8B9271-A2A2-472F-B41C-A6F2D822A12A}" srcId="{4FE72073-87F2-49D3-BB60-21AC8AD2BACA}" destId="{E691227B-B465-4669-8DB1-D65C9D809875}" srcOrd="0" destOrd="0" parTransId="{CF691457-7C57-409A-9F6B-0EC884D1B29D}" sibTransId="{BC48CC3F-5664-4D55-98B3-2ADD69CD67FB}"/>
-    <dgm:cxn modelId="{C3FC7A1A-5D90-4F3A-87F0-203AAA8145E6}" type="presOf" srcId="{42B1BD90-C05C-4E22-BAF6-B010D850747E}" destId="{5CDFF7C4-1CB5-435B-8D92-FC7156893207}" srcOrd="0" destOrd="0" presId="urn:microsoft.com/office/officeart/2005/8/layout/orgChart1"/>
-    <dgm:cxn modelId="{B2E8EBDD-2044-4FB1-9ECC-FA58FE1C1BB0}" type="presOf" srcId="{164A63FD-52B7-41B8-8FD1-D783C9114C9B}" destId="{1AD14AB7-2AEA-4B7B-921B-60407B96DD0B}" srcOrd="0" destOrd="0" presId="urn:microsoft.com/office/officeart/2005/8/layout/orgChart1"/>
-    <dgm:cxn modelId="{C0432A1C-699B-48E7-B6DA-EB7D5C344497}" srcId="{44A7776A-8B7D-4EEA-867E-145D596E53FA}" destId="{164A63FD-52B7-41B8-8FD1-D783C9114C9B}" srcOrd="2" destOrd="0" parTransId="{F745B2AB-5E04-461C-8693-33B31584D5A1}" sibTransId="{7F222700-4E6C-4E42-8AFE-202B24B7F808}"/>
-    <dgm:cxn modelId="{3992A9D2-F1B2-411B-841C-7E67058A2A56}" type="presOf" srcId="{AC05D588-6CAB-4315-A480-DC0EDF3465C0}" destId="{E11FDF21-ABDA-4873-AD0F-D2120EC186B1}" srcOrd="0" destOrd="0" presId="urn:microsoft.com/office/officeart/2005/8/layout/orgChart1"/>
-    <dgm:cxn modelId="{9727C294-1AA7-4F70-862E-FDF4E687B912}" srcId="{ECD8AE38-2507-4D77-ACC8-708E41D2CC38}" destId="{44A7776A-8B7D-4EEA-867E-145D596E53FA}" srcOrd="0" destOrd="0" parTransId="{0E7B2578-2563-4E2E-B96C-AAFE438BA7CC}" sibTransId="{77ED911C-FF4B-4656-855D-75B940C9B4FC}"/>
     <dgm:cxn modelId="{9E1881B7-9E8B-4857-BD8C-CAADABABFDD2}" type="presOf" srcId="{44A7776A-8B7D-4EEA-867E-145D596E53FA}" destId="{ABC3790C-3173-4C58-9316-9E3FFADBB0A1}" srcOrd="1" destOrd="0" presId="urn:microsoft.com/office/officeart/2005/8/layout/orgChart1"/>
-    <dgm:cxn modelId="{FD0BC65D-15EA-4FEC-9E6F-821E6D621736}" type="presOf" srcId="{E691227B-B465-4669-8DB1-D65C9D809875}" destId="{27615001-C90D-4798-97D7-8F54D9DF7617}" srcOrd="0" destOrd="0" presId="urn:microsoft.com/office/officeart/2005/8/layout/orgChart1"/>
-    <dgm:cxn modelId="{5161F01C-8D59-4384-BDE4-165E074BF83A}" type="presOf" srcId="{0609CC73-6F1D-4483-B9D1-EDCCB2EB157B}" destId="{14366BED-FF36-4D1B-BE58-2D837331A10C}" srcOrd="0" destOrd="0" presId="urn:microsoft.com/office/officeart/2005/8/layout/orgChart1"/>
-    <dgm:cxn modelId="{519EF8D0-ECBF-4F82-A4F1-7B2310E22129}" type="presOf" srcId="{470511EE-D208-4BEA-B0B1-C7383C13E5E4}" destId="{A0B21C92-6A5D-4A61-9FCD-935810D29247}" srcOrd="1" destOrd="0" presId="urn:microsoft.com/office/officeart/2005/8/layout/orgChart1"/>
-    <dgm:cxn modelId="{E0F5E952-6A33-4E87-B779-72C1E157125F}" type="presOf" srcId="{F745B2AB-5E04-461C-8693-33B31584D5A1}" destId="{EE9D595B-F20D-497D-B6FD-9C56A2480F7F}" srcOrd="0" destOrd="0" presId="urn:microsoft.com/office/officeart/2005/8/layout/orgChart1"/>
-    <dgm:cxn modelId="{4A30AB42-8159-4FE7-9BA1-F725F0AE7942}" type="presOf" srcId="{6A846C01-EE80-4B52-B9C5-59535959553D}" destId="{1B061F40-C420-42AD-951A-9D8F2BF9D8B8}" srcOrd="1" destOrd="0" presId="urn:microsoft.com/office/officeart/2005/8/layout/orgChart1"/>
-    <dgm:cxn modelId="{EF9FC286-AF36-4E69-9790-99FBB4887B5E}" srcId="{164A63FD-52B7-41B8-8FD1-D783C9114C9B}" destId="{6A846C01-EE80-4B52-B9C5-59535959553D}" srcOrd="0" destOrd="0" parTransId="{42B1BD90-C05C-4E22-BAF6-B010D850747E}" sibTransId="{9E35A7ED-1A3B-4A2C-82FB-D046DA8F4FAB}"/>
-    <dgm:cxn modelId="{7B323717-0035-4730-9CEF-739629A8FBE6}" type="presOf" srcId="{0E7B2578-2563-4E2E-B96C-AAFE438BA7CC}" destId="{61BDF8D2-7298-4DC9-B24B-E1E87334A52C}" srcOrd="0" destOrd="0" presId="urn:microsoft.com/office/officeart/2005/8/layout/orgChart1"/>
-    <dgm:cxn modelId="{6BA4205D-0219-4B9D-A347-A124EA9A7A50}" type="presOf" srcId="{164A63FD-52B7-41B8-8FD1-D783C9114C9B}" destId="{073B3470-7FAD-4A2B-B88F-A490B349B746}" srcOrd="1" destOrd="0" presId="urn:microsoft.com/office/officeart/2005/8/layout/orgChart1"/>
-    <dgm:cxn modelId="{1F135B92-91B7-4574-9B8C-C6EC6C6F6750}" type="presOf" srcId="{7800C4E9-60AC-45A6-A713-ED9A99DE68DF}" destId="{CE571024-4671-45F2-9BCD-C14C25856AA3}" srcOrd="1" destOrd="0" presId="urn:microsoft.com/office/officeart/2005/8/layout/orgChart1"/>
-    <dgm:cxn modelId="{44F28508-71C9-409F-8A4B-5A9D3D815511}" type="presOf" srcId="{E691227B-B465-4669-8DB1-D65C9D809875}" destId="{D2ED5B10-721D-4634-BB4D-C22FCFE20B92}" srcOrd="1" destOrd="0" presId="urn:microsoft.com/office/officeart/2005/8/layout/orgChart1"/>
-    <dgm:cxn modelId="{0FAD8E1A-ECBF-4EB4-B8E1-56E41A07CE30}" type="presOf" srcId="{560A2498-4FA8-40E2-9E69-1DA41B9AD521}" destId="{485B7185-41F0-4D2D-BB75-9D8A50A5FA92}" srcOrd="1" destOrd="0" presId="urn:microsoft.com/office/officeart/2005/8/layout/orgChart1"/>
-    <dgm:cxn modelId="{9BAC8A9B-F028-4EDC-A31A-5733EA86DA2F}" type="presOf" srcId="{6A846C01-EE80-4B52-B9C5-59535959553D}" destId="{CB98D7D8-64D0-4343-BBB5-FC48AA48F504}" srcOrd="0" destOrd="0" presId="urn:microsoft.com/office/officeart/2005/8/layout/orgChart1"/>
-    <dgm:cxn modelId="{274B8763-FC35-475B-9157-3409FC9C874F}" type="presOf" srcId="{CF691457-7C57-409A-9F6B-0EC884D1B29D}" destId="{37997045-4A33-41F8-8303-CA2EB5054D81}" srcOrd="0" destOrd="0" presId="urn:microsoft.com/office/officeart/2005/8/layout/orgChart1"/>
-    <dgm:cxn modelId="{433E3D16-F697-4E1E-A866-6BD0D1533F7A}" type="presOf" srcId="{4FE72073-87F2-49D3-BB60-21AC8AD2BACA}" destId="{9A6CCAC9-4CB1-42F2-9D18-CED648A78E9D}" srcOrd="1" destOrd="0" presId="urn:microsoft.com/office/officeart/2005/8/layout/orgChart1"/>
-    <dgm:cxn modelId="{A48E8B8C-8449-4ED3-A093-FA570F343D04}" type="presOf" srcId="{ECD8AE38-2507-4D77-ACC8-708E41D2CC38}" destId="{0BA20DC5-2B68-48AD-BC31-110E92094059}" srcOrd="0" destOrd="0" presId="urn:microsoft.com/office/officeart/2005/8/layout/orgChart1"/>
-    <dgm:cxn modelId="{50894702-47DA-488F-9C7B-2CB8DD6E930A}" srcId="{44A7776A-8B7D-4EEA-867E-145D596E53FA}" destId="{560A2498-4FA8-40E2-9E69-1DA41B9AD521}" srcOrd="1" destOrd="0" parTransId="{3258CBAC-7A1C-451E-AE16-718A125E86BD}" sibTransId="{F9590B73-4FC2-40BE-ACCF-4EB2DD7466E4}"/>
-    <dgm:cxn modelId="{5FC07903-09B8-425C-8E7C-B7DED5273C7B}" srcId="{560A2498-4FA8-40E2-9E69-1DA41B9AD521}" destId="{470511EE-D208-4BEA-B0B1-C7383C13E5E4}" srcOrd="0" destOrd="0" parTransId="{7ACC1E73-587D-466F-82B3-7A1E2C398467}" sibTransId="{DF0A0F1C-A3CD-462F-A569-57E1649C7679}"/>
-    <dgm:cxn modelId="{73E8F912-8366-4888-9B46-D1D0A5D2C764}" type="presOf" srcId="{AC05D588-6CAB-4315-A480-DC0EDF3465C0}" destId="{B60366E3-7C78-4560-B359-3FCB33F0C5FE}" srcOrd="1" destOrd="0" presId="urn:microsoft.com/office/officeart/2005/8/layout/orgChart1"/>
-    <dgm:cxn modelId="{CFD0CCE7-77B9-4C9C-8F98-948FA60FAA4C}" type="presOf" srcId="{560A2498-4FA8-40E2-9E69-1DA41B9AD521}" destId="{F93F34D8-1ED5-4397-940C-31CEB3387FC2}" srcOrd="0" destOrd="0" presId="urn:microsoft.com/office/officeart/2005/8/layout/orgChart1"/>
-    <dgm:cxn modelId="{F80BE0E8-BFF8-4377-8350-32F63AE56B6A}" type="presOf" srcId="{22CE5E4B-9806-4205-AAD6-8E7B8BECDDB5}" destId="{E73A4FD3-6C88-4FBD-9EDD-78DDA8798AD4}" srcOrd="1" destOrd="0" presId="urn:microsoft.com/office/officeart/2005/8/layout/orgChart1"/>
-    <dgm:cxn modelId="{32BA0F0E-A2D8-400D-A1C9-E18249709052}" type="presOf" srcId="{7800C4E9-60AC-45A6-A713-ED9A99DE68DF}" destId="{2045300A-02B9-4CE0-A6F1-374E3251FEAE}" srcOrd="0" destOrd="0" presId="urn:microsoft.com/office/officeart/2005/8/layout/orgChart1"/>
     <dgm:cxn modelId="{0347D06E-F606-48B0-98DC-00424B148AC0}" type="presParOf" srcId="{F157BA3F-8B20-4116-A18A-54C82ACB553F}" destId="{A50C142B-38C3-44FD-AEA9-1E2D0A27DF5E}" srcOrd="0" destOrd="0" presId="urn:microsoft.com/office/officeart/2005/8/layout/orgChart1"/>
     <dgm:cxn modelId="{1BE75ABD-C15E-4D46-B34C-03FDD6EE56F9}" type="presParOf" srcId="{A50C142B-38C3-44FD-AEA9-1E2D0A27DF5E}" destId="{4A8DF312-8035-4E9F-80BD-145B2E9ACCEE}" srcOrd="0" destOrd="0" presId="urn:microsoft.com/office/officeart/2005/8/layout/orgChart1"/>
     <dgm:cxn modelId="{613CA539-9FEF-4754-A55E-88DD3272BB40}" type="presParOf" srcId="{4A8DF312-8035-4E9F-80BD-145B2E9ACCEE}" destId="{0BA20DC5-2B68-48AD-BC31-110E92094059}" srcOrd="0" destOrd="0" presId="urn:microsoft.com/office/officeart/2005/8/layout/orgChart1"/>
@@ -5642,7 +5824,7 @@
           <a:effectLst/>
           <a:extLst>
             <a:ext uri="{91240B29-F687-4f45-9708-019B960494DF}">
-              <a14:hiddenLine xmlns:a14="http://schemas.microsoft.com/office/drawing/2010/main" xmlns="" w="9525">
+              <a14:hiddenLine xmlns="" xmlns:a14="http://schemas.microsoft.com/office/drawing/2010/main" w="9525">
                 <a:solidFill>
                   <a:srgbClr val="000000"/>
                 </a:solidFill>
@@ -5835,7 +6017,7 @@
             <a:fld id="{08B9EBBA-996F-894A-B54A-D6246ED52CEA}" type="datetimeFigureOut">
               <a:rPr lang="en-US" dirty="0"/>
               <a:pPr/>
-              <a:t>4/2/2013</a:t>
+              <a:t>4/3/2013</a:t>
             </a:fld>
             <a:endParaRPr lang="en-US" dirty="0"/>
           </a:p>
@@ -6150,7 +6332,7 @@
             <a:fld id="{18C79C5D-2A6F-F04D-97DA-BEF2467B64E4}" type="datetimeFigureOut">
               <a:rPr lang="en-US" dirty="0"/>
               <a:pPr/>
-              <a:t>4/2/2013</a:t>
+              <a:t>4/3/2013</a:t>
             </a:fld>
             <a:endParaRPr lang="en-US" dirty="0"/>
           </a:p>
@@ -6635,7 +6817,7 @@
             <a:fld id="{8DFA1846-DA80-1C48-A609-854EA85C59AD}" type="datetimeFigureOut">
               <a:rPr lang="en-US" dirty="0"/>
               <a:pPr/>
-              <a:t>4/2/2013</a:t>
+              <a:t>4/3/2013</a:t>
             </a:fld>
             <a:endParaRPr lang="en-US" dirty="0"/>
           </a:p>
@@ -7001,7 +7183,7 @@
             <a:fld id="{FBF54567-0DE4-3F47-BF90-CB84690072F9}" type="datetimeFigureOut">
               <a:rPr lang="en-US" dirty="0"/>
               <a:pPr/>
-              <a:t>4/2/2013</a:t>
+              <a:t>4/3/2013</a:t>
             </a:fld>
             <a:endParaRPr lang="en-US" dirty="0"/>
           </a:p>
@@ -7152,7 +7334,7 @@
           <a:ln/>
           <a:extLst>
             <a:ext uri="{91240B29-F687-4f45-9708-019B960494DF}">
-              <a14:hiddenLine xmlns:a14="http://schemas.microsoft.com/office/drawing/2010/main" xmlns="" w="9525">
+              <a14:hiddenLine xmlns="" xmlns:a14="http://schemas.microsoft.com/office/drawing/2010/main" w="9525">
                 <a:solidFill>
                   <a:srgbClr val="000000"/>
                 </a:solidFill>
@@ -7271,7 +7453,7 @@
             <a:fld id="{C6C52C72-DE31-F449-A4ED-4C594FD91407}" type="datetimeFigureOut">
               <a:rPr lang="en-US" dirty="0"/>
               <a:pPr/>
-              <a:t>4/2/2013</a:t>
+              <a:t>4/3/2013</a:t>
             </a:fld>
             <a:endParaRPr lang="en-US" dirty="0"/>
           </a:p>
@@ -7424,7 +7606,7 @@
           <a:ln/>
           <a:extLst>
             <a:ext uri="{91240B29-F687-4f45-9708-019B960494DF}">
-              <a14:hiddenLine xmlns:a14="http://schemas.microsoft.com/office/drawing/2010/main" xmlns="" w="9525">
+              <a14:hiddenLine xmlns="" xmlns:a14="http://schemas.microsoft.com/office/drawing/2010/main" w="9525">
                 <a:solidFill>
                   <a:srgbClr val="000000"/>
                 </a:solidFill>
@@ -7553,7 +7735,7 @@
             <a:fld id="{ED62726E-379B-B349-9EED-81ED093FA806}" type="datetimeFigureOut">
               <a:rPr lang="en-US" dirty="0"/>
               <a:pPr/>
-              <a:t>4/2/2013</a:t>
+              <a:t>4/3/2013</a:t>
             </a:fld>
             <a:endParaRPr lang="en-US" dirty="0"/>
           </a:p>
@@ -7704,7 +7886,7 @@
           <a:ln/>
           <a:extLst>
             <a:ext uri="{91240B29-F687-4f45-9708-019B960494DF}">
-              <a14:hiddenLine xmlns:a14="http://schemas.microsoft.com/office/drawing/2010/main" xmlns="" w="9525">
+              <a14:hiddenLine xmlns="" xmlns:a14="http://schemas.microsoft.com/office/drawing/2010/main" w="9525">
                 <a:solidFill>
                   <a:srgbClr val="000000"/>
                 </a:solidFill>
@@ -7833,7 +8015,7 @@
             <a:fld id="{9B3A1323-8D79-1946-B0D7-40001CF92E9D}" type="datetimeFigureOut">
               <a:rPr lang="en-US" dirty="0"/>
               <a:pPr/>
-              <a:t>4/2/2013</a:t>
+              <a:t>4/3/2013</a:t>
             </a:fld>
             <a:endParaRPr lang="en-US" dirty="0"/>
           </a:p>
@@ -8173,7 +8355,7 @@
             <a:fld id="{8DFA1846-DA80-1C48-A609-854EA85C59AD}" type="datetimeFigureOut">
               <a:rPr lang="en-US" dirty="0"/>
               <a:pPr/>
-              <a:t>4/2/2013</a:t>
+              <a:t>4/3/2013</a:t>
             </a:fld>
             <a:endParaRPr lang="en-US" dirty="0"/>
           </a:p>
@@ -8324,7 +8506,7 @@
           <a:ln/>
           <a:extLst>
             <a:ext uri="{91240B29-F687-4f45-9708-019B960494DF}">
-              <a14:hiddenLine xmlns:a14="http://schemas.microsoft.com/office/drawing/2010/main" xmlns="" w="9525">
+              <a14:hiddenLine xmlns="" xmlns:a14="http://schemas.microsoft.com/office/drawing/2010/main" w="9525">
                 <a:solidFill>
                   <a:srgbClr val="000000"/>
                 </a:solidFill>
@@ -8509,7 +8691,7 @@
             <a:fld id="{57302355-E14B-8545-A8F8-0FE83CC9D524}" type="datetimeFigureOut">
               <a:rPr lang="en-US" dirty="0"/>
               <a:pPr/>
-              <a:t>4/2/2013</a:t>
+              <a:t>4/3/2013</a:t>
             </a:fld>
             <a:endParaRPr lang="en-US" dirty="0"/>
           </a:p>
@@ -8660,7 +8842,7 @@
           <a:ln/>
           <a:extLst>
             <a:ext uri="{91240B29-F687-4f45-9708-019B960494DF}">
-              <a14:hiddenLine xmlns:a14="http://schemas.microsoft.com/office/drawing/2010/main" xmlns="" w="9525">
+              <a14:hiddenLine xmlns="" xmlns:a14="http://schemas.microsoft.com/office/drawing/2010/main" w="9525">
                 <a:solidFill>
                   <a:srgbClr val="000000"/>
                 </a:solidFill>
@@ -8983,7 +9165,7 @@
             <a:fld id="{02640F58-564D-2B4F-AE67-E407BA4FCF45}" type="datetimeFigureOut">
               <a:rPr lang="en-US" dirty="0"/>
               <a:pPr/>
-              <a:t>4/2/2013</a:t>
+              <a:t>4/3/2013</a:t>
             </a:fld>
             <a:endParaRPr lang="en-US" dirty="0"/>
           </a:p>
@@ -9134,7 +9316,7 @@
           <a:ln/>
           <a:extLst>
             <a:ext uri="{91240B29-F687-4f45-9708-019B960494DF}">
-              <a14:hiddenLine xmlns:a14="http://schemas.microsoft.com/office/drawing/2010/main" xmlns="" w="9525">
+              <a14:hiddenLine xmlns="" xmlns:a14="http://schemas.microsoft.com/office/drawing/2010/main" w="9525">
                 <a:solidFill>
                   <a:srgbClr val="000000"/>
                 </a:solidFill>
@@ -9201,7 +9383,7 @@
             <a:fld id="{F13A34C8-038E-2045-AF43-DF7DBB8E0E9E}" type="datetimeFigureOut">
               <a:rPr lang="en-US" dirty="0"/>
               <a:pPr/>
-              <a:t>4/2/2013</a:t>
+              <a:t>4/3/2013</a:t>
             </a:fld>
             <a:endParaRPr lang="en-US" dirty="0"/>
           </a:p>
@@ -9293,7 +9475,7 @@
             <a:fld id="{8818C68F-D26B-8F47-958C-23B49CF8A634}" type="datetimeFigureOut">
               <a:rPr lang="en-US" dirty="0"/>
               <a:pPr/>
-              <a:t>4/2/2013</a:t>
+              <a:t>4/3/2013</a:t>
             </a:fld>
             <a:endParaRPr lang="en-US" dirty="0"/>
           </a:p>
@@ -9557,7 +9739,7 @@
           <a:ln/>
           <a:extLst>
             <a:ext uri="{91240B29-F687-4f45-9708-019B960494DF}">
-              <a14:hiddenLine xmlns:a14="http://schemas.microsoft.com/office/drawing/2010/main" xmlns="" w="9525">
+              <a14:hiddenLine xmlns="" xmlns:a14="http://schemas.microsoft.com/office/drawing/2010/main" w="9525">
                 <a:solidFill>
                   <a:srgbClr val="000000"/>
                 </a:solidFill>
@@ -9757,7 +9939,7 @@
             <a:fld id="{D0DF5E60-9974-AC48-9591-99C2BB44B7CF}" type="datetimeFigureOut">
               <a:rPr lang="en-US" dirty="0"/>
               <a:pPr/>
-              <a:t>4/2/2013</a:t>
+              <a:t>4/3/2013</a:t>
             </a:fld>
             <a:endParaRPr lang="en-US" dirty="0"/>
           </a:p>
@@ -10067,7 +10249,7 @@
             <a:fld id="{18C79C5D-2A6F-F04D-97DA-BEF2467B64E4}" type="datetimeFigureOut">
               <a:rPr lang="en-US" dirty="0"/>
               <a:pPr/>
-              <a:t>4/2/2013</a:t>
+              <a:t>4/3/2013</a:t>
             </a:fld>
             <a:endParaRPr lang="en-US" dirty="0"/>
           </a:p>
@@ -10334,7 +10516,7 @@
             <a:fld id="{09B482E8-6E0E-1B4F-B1FD-C69DB9E858D9}" type="datetimeFigureOut">
               <a:rPr lang="en-US" dirty="0"/>
               <a:pPr/>
-              <a:t>4/2/2013</a:t>
+              <a:t>4/3/2013</a:t>
             </a:fld>
             <a:endParaRPr lang="en-US" dirty="0"/>
           </a:p>
@@ -10844,6 +11026,13 @@
   <p:clrMapOvr>
     <a:masterClrMapping/>
   </p:clrMapOvr>
+  <p:timing>
+    <p:tnLst>
+      <p:par>
+        <p:cTn id="1" dur="indefinite" restart="never" nodeType="tmRoot"/>
+      </p:par>
+    </p:tnLst>
+  </p:timing>
 </p:sld>
 </file>
 
@@ -12015,40 +12204,98 @@
           <a:lstStyle/>
           <a:p>
             <a:r>
-              <a:rPr lang="en-CA" dirty="0" smtClean="0"/>
-              <a:t>This slide for Gary</a:t>
-            </a:r>
-            <a:endParaRPr lang="en-CA" dirty="0"/>
+              <a:rPr lang="en-US" dirty="0" smtClean="0"/>
+              <a:t>Administrator View</a:t>
+            </a:r>
+            <a:endParaRPr lang="en-US" dirty="0"/>
           </a:p>
         </p:txBody>
       </p:sp>
-      <p:sp>
-        <p:nvSpPr>
-          <p:cNvPr id="6" name="Text Placeholder 5"/>
-          <p:cNvSpPr>
-            <a:spLocks noGrp="1"/>
-          </p:cNvSpPr>
-          <p:nvPr>
-            <p:ph type="body" sz="quarter" idx="16"/>
-          </p:nvPr>
-        </p:nvSpPr>
-        <p:spPr/>
-        <p:txBody>
-          <a:bodyPr/>
-          <a:lstStyle/>
-          <a:p>
-            <a:r>
-              <a:rPr lang="en-CA" dirty="0" smtClean="0"/>
-              <a:t>Put pictures of your application here</a:t>
-            </a:r>
-            <a:endParaRPr lang="en-CA" dirty="0"/>
-          </a:p>
-        </p:txBody>
-      </p:sp>
+      <p:pic>
+        <p:nvPicPr>
+          <p:cNvPr id="7" name="Content Placeholder 6"/>
+          <p:cNvPicPr>
+            <a:picLocks noGrp="1" noChangeAspect="1"/>
+          </p:cNvPicPr>
+          <p:nvPr>
+            <p:ph idx="1"/>
+          </p:nvPr>
+        </p:nvPicPr>
+        <p:blipFill>
+          <a:blip r:embed="rId2">
+            <a:extLst>
+              <a:ext uri="{28A0092B-C50C-407E-A947-70E740481C1C}">
+                <a14:useLocalDpi xmlns:a14="http://schemas.microsoft.com/office/drawing/2010/main" val="0"/>
+              </a:ext>
+            </a:extLst>
+          </a:blip>
+          <a:stretch>
+            <a:fillRect/>
+          </a:stretch>
+        </p:blipFill>
+        <p:spPr>
+          <a:xfrm>
+            <a:off x="995308" y="2908415"/>
+            <a:ext cx="4277322" cy="2734057"/>
+          </a:xfrm>
+          <a:effectLst>
+            <a:glow rad="228600">
+              <a:schemeClr val="accent1">
+                <a:satMod val="175000"/>
+                <a:alpha val="40000"/>
+              </a:schemeClr>
+            </a:glow>
+            <a:outerShdw blurRad="50800" dir="14400000">
+              <a:srgbClr val="000000">
+                <a:alpha val="40000"/>
+              </a:srgbClr>
+            </a:outerShdw>
+            <a:softEdge rad="0"/>
+          </a:effectLst>
+        </p:spPr>
+      </p:pic>
+      <p:pic>
+        <p:nvPicPr>
+          <p:cNvPr id="8" name="Picture 7"/>
+          <p:cNvPicPr>
+            <a:picLocks noChangeAspect="1"/>
+          </p:cNvPicPr>
+          <p:nvPr/>
+        </p:nvPicPr>
+        <p:blipFill>
+          <a:blip r:embed="rId3">
+            <a:extLst>
+              <a:ext uri="{28A0092B-C50C-407E-A947-70E740481C1C}">
+                <a14:useLocalDpi xmlns:a14="http://schemas.microsoft.com/office/drawing/2010/main" val="0"/>
+              </a:ext>
+            </a:extLst>
+          </a:blip>
+          <a:stretch>
+            <a:fillRect/>
+          </a:stretch>
+        </p:blipFill>
+        <p:spPr>
+          <a:xfrm>
+            <a:off x="7084290" y="2026483"/>
+            <a:ext cx="3495055" cy="4711444"/>
+          </a:xfrm>
+          <a:prstGeom prst="rect">
+            <a:avLst/>
+          </a:prstGeom>
+          <a:effectLst>
+            <a:glow rad="228600">
+              <a:schemeClr val="accent1">
+                <a:satMod val="175000"/>
+                <a:alpha val="40000"/>
+              </a:schemeClr>
+            </a:glow>
+          </a:effectLst>
+        </p:spPr>
+      </p:pic>
     </p:spTree>
     <p:extLst>
       <p:ext uri="{BB962C8B-B14F-4D97-AF65-F5344CB8AC3E}">
-        <p14:creationId xmlns:p14="http://schemas.microsoft.com/office/powerpoint/2010/main" val="3046105620"/>
+        <p14:creationId xmlns:p14="http://schemas.microsoft.com/office/powerpoint/2010/main" val="537344857"/>
       </p:ext>
     </p:extLst>
   </p:cSld>
@@ -12181,12 +12428,8 @@
           <a:lstStyle/>
           <a:p>
             <a:r>
-              <a:rPr lang="en-CA" b="0" dirty="0" smtClean="0"/>
-              <a:t>The</a:t>
-            </a:r>
-            <a:r>
               <a:rPr lang="en-CA" dirty="0" smtClean="0"/>
-              <a:t> Details</a:t>
+              <a:t>Login</a:t>
             </a:r>
             <a:endParaRPr lang="en-CA" dirty="0"/>
           </a:p>
@@ -12207,6 +12450,602 @@
           <a:bodyPr/>
           <a:lstStyle/>
           <a:p>
+            <a:pPr marL="285750" indent="-285750">
+              <a:buFont typeface="Arial" panose="020B0604020202020204" pitchFamily="34" charset="0"/>
+              <a:buChar char="•"/>
+            </a:pPr>
+            <a:r>
+              <a:rPr lang="en-CA" dirty="0" smtClean="0"/>
+              <a:t>Consistent simplicity between client and administrator view</a:t>
+            </a:r>
+          </a:p>
+          <a:p>
+            <a:pPr marL="285750" indent="-285750">
+              <a:buFont typeface="Arial" panose="020B0604020202020204" pitchFamily="34" charset="0"/>
+              <a:buChar char="•"/>
+            </a:pPr>
+            <a:r>
+              <a:rPr lang="en-CA" dirty="0" smtClean="0"/>
+              <a:t>Can only be accessed through the local network.</a:t>
+            </a:r>
+          </a:p>
+          <a:p>
+            <a:pPr marL="285750" indent="-285750">
+              <a:buFont typeface="Arial" panose="020B0604020202020204" pitchFamily="34" charset="0"/>
+              <a:buChar char="•"/>
+            </a:pPr>
+            <a:r>
+              <a:rPr lang="en-CA" dirty="0" smtClean="0"/>
+              <a:t>Stylistic features are somewhat eye-pleasing.</a:t>
+            </a:r>
+          </a:p>
+          <a:p>
+            <a:pPr marL="285750" indent="-285750">
+              <a:buFont typeface="Arial" panose="020B0604020202020204" pitchFamily="34" charset="0"/>
+              <a:buChar char="•"/>
+            </a:pPr>
+            <a:endParaRPr lang="en-CA" dirty="0"/>
+          </a:p>
+        </p:txBody>
+      </p:sp>
+      <p:pic>
+        <p:nvPicPr>
+          <p:cNvPr id="7" name="Content Placeholder 6"/>
+          <p:cNvPicPr>
+            <a:picLocks noGrp="1" noChangeAspect="1"/>
+          </p:cNvPicPr>
+          <p:nvPr>
+            <p:ph idx="1"/>
+          </p:nvPr>
+        </p:nvPicPr>
+        <p:blipFill>
+          <a:blip r:embed="rId2">
+            <a:extLst>
+              <a:ext uri="{28A0092B-C50C-407E-A947-70E740481C1C}">
+                <a14:useLocalDpi xmlns:a14="http://schemas.microsoft.com/office/drawing/2010/main" val="0"/>
+              </a:ext>
+            </a:extLst>
+          </a:blip>
+          <a:stretch>
+            <a:fillRect/>
+          </a:stretch>
+        </p:blipFill>
+        <p:spPr>
+          <a:xfrm>
+            <a:off x="7340981" y="1142110"/>
+            <a:ext cx="4277322" cy="2734057"/>
+          </a:xfrm>
+          <a:effectLst>
+            <a:glow rad="228600">
+              <a:schemeClr val="accent1">
+                <a:satMod val="175000"/>
+                <a:alpha val="40000"/>
+              </a:schemeClr>
+            </a:glow>
+            <a:outerShdw blurRad="50800" dir="14400000">
+              <a:srgbClr val="000000">
+                <a:alpha val="40000"/>
+              </a:srgbClr>
+            </a:outerShdw>
+            <a:softEdge rad="0"/>
+          </a:effectLst>
+        </p:spPr>
+      </p:pic>
+    </p:spTree>
+    <p:extLst>
+      <p:ext uri="{BB962C8B-B14F-4D97-AF65-F5344CB8AC3E}">
+        <p14:creationId xmlns:p14="http://schemas.microsoft.com/office/powerpoint/2010/main" val="3046105620"/>
+      </p:ext>
+    </p:extLst>
+  </p:cSld>
+  <p:clrMapOvr>
+    <a:masterClrMapping/>
+  </p:clrMapOvr>
+  <p:timing>
+    <p:tnLst>
+      <p:par>
+        <p:cTn id="1" dur="indefinite" restart="never" nodeType="tmRoot"/>
+      </p:par>
+    </p:tnLst>
+  </p:timing>
+</p:sld>
+</file>
+
+<file path=ppt/slides/slide21.xml><?xml version="1.0" encoding="utf-8"?>
+<p:sld xmlns:a="http://schemas.openxmlformats.org/drawingml/2006/main" xmlns:r="http://schemas.openxmlformats.org/officeDocument/2006/relationships" xmlns:p="http://schemas.openxmlformats.org/presentationml/2006/main">
+  <p:cSld>
+    <p:spTree>
+      <p:nvGrpSpPr>
+        <p:cNvPr id="1" name=""/>
+        <p:cNvGrpSpPr/>
+        <p:nvPr/>
+      </p:nvGrpSpPr>
+      <p:grpSpPr>
+        <a:xfrm>
+          <a:off x="0" y="0"/>
+          <a:ext cx="0" cy="0"/>
+          <a:chOff x="0" y="0"/>
+          <a:chExt cx="0" cy="0"/>
+        </a:xfrm>
+      </p:grpSpPr>
+      <p:sp>
+        <p:nvSpPr>
+          <p:cNvPr id="2" name="Title 1"/>
+          <p:cNvSpPr>
+            <a:spLocks noGrp="1"/>
+          </p:cNvSpPr>
+          <p:nvPr>
+            <p:ph type="title"/>
+          </p:nvPr>
+        </p:nvSpPr>
+        <p:spPr/>
+        <p:txBody>
+          <a:bodyPr/>
+          <a:lstStyle/>
+          <a:p>
+            <a:r>
+              <a:rPr lang="en-US" dirty="0" smtClean="0"/>
+              <a:t>Registration</a:t>
+            </a:r>
+            <a:endParaRPr lang="en-US" dirty="0"/>
+          </a:p>
+        </p:txBody>
+      </p:sp>
+      <p:sp>
+        <p:nvSpPr>
+          <p:cNvPr id="3" name="Text Placeholder 2"/>
+          <p:cNvSpPr>
+            <a:spLocks noGrp="1"/>
+          </p:cNvSpPr>
+          <p:nvPr>
+            <p:ph type="body" idx="1"/>
+          </p:nvPr>
+        </p:nvSpPr>
+        <p:spPr/>
+        <p:txBody>
+          <a:bodyPr/>
+          <a:lstStyle/>
+          <a:p>
+            <a:pPr marL="285750" indent="-285750">
+              <a:buFont typeface="Arial" panose="020B0604020202020204" pitchFamily="34" charset="0"/>
+              <a:buChar char="•"/>
+            </a:pPr>
+            <a:r>
+              <a:rPr lang="en-US" dirty="0" smtClean="0"/>
+              <a:t>Straightforward</a:t>
+            </a:r>
+          </a:p>
+          <a:p>
+            <a:pPr marL="285750" indent="-285750">
+              <a:buFont typeface="Arial" panose="020B0604020202020204" pitchFamily="34" charset="0"/>
+              <a:buChar char="•"/>
+            </a:pPr>
+            <a:r>
+              <a:rPr lang="en-US" dirty="0" smtClean="0"/>
+              <a:t>Validates on client-side</a:t>
+            </a:r>
+          </a:p>
+          <a:p>
+            <a:pPr marL="285750" indent="-285750">
+              <a:buFont typeface="Arial" panose="020B0604020202020204" pitchFamily="34" charset="0"/>
+              <a:buChar char="•"/>
+            </a:pPr>
+            <a:r>
+              <a:rPr lang="en-US" dirty="0" smtClean="0"/>
+              <a:t>Validates on server-side</a:t>
+            </a:r>
+          </a:p>
+          <a:p>
+            <a:pPr marL="285750" indent="-285750">
+              <a:buFont typeface="Arial" panose="020B0604020202020204" pitchFamily="34" charset="0"/>
+              <a:buChar char="•"/>
+            </a:pPr>
+            <a:r>
+              <a:rPr lang="en-US" dirty="0" smtClean="0"/>
+              <a:t>Creates new users in the database, which are immediately accessible.</a:t>
+            </a:r>
+            <a:endParaRPr lang="en-US" dirty="0"/>
+          </a:p>
+        </p:txBody>
+      </p:sp>
+      <p:pic>
+        <p:nvPicPr>
+          <p:cNvPr id="5" name="Picture 4"/>
+          <p:cNvPicPr>
+            <a:picLocks noChangeAspect="1"/>
+          </p:cNvPicPr>
+          <p:nvPr/>
+        </p:nvPicPr>
+        <p:blipFill>
+          <a:blip r:embed="rId2">
+            <a:extLst>
+              <a:ext uri="{28A0092B-C50C-407E-A947-70E740481C1C}">
+                <a14:useLocalDpi xmlns:a14="http://schemas.microsoft.com/office/drawing/2010/main" val="0"/>
+              </a:ext>
+            </a:extLst>
+          </a:blip>
+          <a:stretch>
+            <a:fillRect/>
+          </a:stretch>
+        </p:blipFill>
+        <p:spPr>
+          <a:xfrm>
+            <a:off x="7499988" y="1580888"/>
+            <a:ext cx="3959308" cy="2404485"/>
+          </a:xfrm>
+          <a:prstGeom prst="rect">
+            <a:avLst/>
+          </a:prstGeom>
+          <a:effectLst>
+            <a:glow rad="228600">
+              <a:schemeClr val="accent1">
+                <a:satMod val="175000"/>
+                <a:alpha val="40000"/>
+              </a:schemeClr>
+            </a:glow>
+          </a:effectLst>
+        </p:spPr>
+      </p:pic>
+    </p:spTree>
+    <p:extLst>
+      <p:ext uri="{BB962C8B-B14F-4D97-AF65-F5344CB8AC3E}">
+        <p14:creationId xmlns:p14="http://schemas.microsoft.com/office/powerpoint/2010/main" val="1176557215"/>
+      </p:ext>
+    </p:extLst>
+  </p:cSld>
+  <p:clrMapOvr>
+    <a:masterClrMapping/>
+  </p:clrMapOvr>
+  <p:timing>
+    <p:tnLst>
+      <p:par>
+        <p:cTn id="1" dur="indefinite" restart="never" nodeType="tmRoot"/>
+      </p:par>
+    </p:tnLst>
+  </p:timing>
+</p:sld>
+</file>
+
+<file path=ppt/slides/slide22.xml><?xml version="1.0" encoding="utf-8"?>
+<p:sld xmlns:a="http://schemas.openxmlformats.org/drawingml/2006/main" xmlns:r="http://schemas.openxmlformats.org/officeDocument/2006/relationships" xmlns:p="http://schemas.openxmlformats.org/presentationml/2006/main">
+  <p:cSld>
+    <p:spTree>
+      <p:nvGrpSpPr>
+        <p:cNvPr id="1" name=""/>
+        <p:cNvGrpSpPr/>
+        <p:nvPr/>
+      </p:nvGrpSpPr>
+      <p:grpSpPr>
+        <a:xfrm>
+          <a:off x="0" y="0"/>
+          <a:ext cx="0" cy="0"/>
+          <a:chOff x="0" y="0"/>
+          <a:chExt cx="0" cy="0"/>
+        </a:xfrm>
+      </p:grpSpPr>
+      <p:sp>
+        <p:nvSpPr>
+          <p:cNvPr id="2" name="Title 1"/>
+          <p:cNvSpPr>
+            <a:spLocks noGrp="1"/>
+          </p:cNvSpPr>
+          <p:nvPr>
+            <p:ph type="title"/>
+          </p:nvPr>
+        </p:nvSpPr>
+        <p:spPr/>
+        <p:txBody>
+          <a:bodyPr/>
+          <a:lstStyle/>
+          <a:p>
+            <a:r>
+              <a:rPr lang="en-US" dirty="0" smtClean="0"/>
+              <a:t>Analytics</a:t>
+            </a:r>
+            <a:endParaRPr lang="en-US" dirty="0"/>
+          </a:p>
+        </p:txBody>
+      </p:sp>
+      <p:sp>
+        <p:nvSpPr>
+          <p:cNvPr id="3" name="Text Placeholder 2"/>
+          <p:cNvSpPr>
+            <a:spLocks noGrp="1"/>
+          </p:cNvSpPr>
+          <p:nvPr>
+            <p:ph type="body" idx="1"/>
+          </p:nvPr>
+        </p:nvSpPr>
+        <p:spPr/>
+        <p:txBody>
+          <a:bodyPr/>
+          <a:lstStyle/>
+          <a:p>
+            <a:pPr marL="285750" indent="-285750">
+              <a:buFont typeface="Arial" panose="020B0604020202020204" pitchFamily="34" charset="0"/>
+              <a:buChar char="•"/>
+            </a:pPr>
+            <a:r>
+              <a:rPr lang="en-US" dirty="0" smtClean="0"/>
+              <a:t>Clear, concise information</a:t>
+            </a:r>
+          </a:p>
+          <a:p>
+            <a:pPr marL="285750" indent="-285750">
+              <a:buFont typeface="Arial" panose="020B0604020202020204" pitchFamily="34" charset="0"/>
+              <a:buChar char="•"/>
+            </a:pPr>
+            <a:r>
+              <a:rPr lang="en-US" dirty="0" smtClean="0"/>
+              <a:t>Easily selectable date ranges.</a:t>
+            </a:r>
+          </a:p>
+          <a:p>
+            <a:pPr marL="285750" indent="-285750">
+              <a:buFont typeface="Arial" panose="020B0604020202020204" pitchFamily="34" charset="0"/>
+              <a:buChar char="•"/>
+            </a:pPr>
+            <a:r>
+              <a:rPr lang="en-US" dirty="0" smtClean="0"/>
+              <a:t>Offers Insights into shift patterns</a:t>
+            </a:r>
+          </a:p>
+          <a:p>
+            <a:pPr marL="285750" indent="-285750">
+              <a:buFont typeface="Arial" panose="020B0604020202020204" pitchFamily="34" charset="0"/>
+              <a:buChar char="•"/>
+            </a:pPr>
+            <a:r>
+              <a:rPr lang="en-US" dirty="0" smtClean="0"/>
+              <a:t>Shows full list of shifts within selected range</a:t>
+            </a:r>
+          </a:p>
+        </p:txBody>
+      </p:sp>
+      <p:sp>
+        <p:nvSpPr>
+          <p:cNvPr id="4" name="Text Placeholder 3"/>
+          <p:cNvSpPr>
+            <a:spLocks noGrp="1"/>
+          </p:cNvSpPr>
+          <p:nvPr>
+            <p:ph type="body" sz="quarter" idx="16"/>
+          </p:nvPr>
+        </p:nvSpPr>
+        <p:spPr/>
+        <p:txBody>
+          <a:bodyPr/>
+          <a:lstStyle/>
+          <a:p>
+            <a:endParaRPr lang="en-US"/>
+          </a:p>
+        </p:txBody>
+      </p:sp>
+      <p:pic>
+        <p:nvPicPr>
+          <p:cNvPr id="5" name="Picture 4"/>
+          <p:cNvPicPr>
+            <a:picLocks noChangeAspect="1"/>
+          </p:cNvPicPr>
+          <p:nvPr/>
+        </p:nvPicPr>
+        <p:blipFill>
+          <a:blip r:embed="rId2">
+            <a:extLst>
+              <a:ext uri="{28A0092B-C50C-407E-A947-70E740481C1C}">
+                <a14:useLocalDpi xmlns:a14="http://schemas.microsoft.com/office/drawing/2010/main" val="0"/>
+              </a:ext>
+            </a:extLst>
+          </a:blip>
+          <a:stretch>
+            <a:fillRect/>
+          </a:stretch>
+        </p:blipFill>
+        <p:spPr>
+          <a:xfrm>
+            <a:off x="7432684" y="498763"/>
+            <a:ext cx="4093915" cy="5518727"/>
+          </a:xfrm>
+          <a:prstGeom prst="rect">
+            <a:avLst/>
+          </a:prstGeom>
+          <a:effectLst>
+            <a:glow rad="228600">
+              <a:schemeClr val="accent1">
+                <a:satMod val="175000"/>
+                <a:alpha val="40000"/>
+              </a:schemeClr>
+            </a:glow>
+          </a:effectLst>
+        </p:spPr>
+      </p:pic>
+    </p:spTree>
+    <p:extLst>
+      <p:ext uri="{BB962C8B-B14F-4D97-AF65-F5344CB8AC3E}">
+        <p14:creationId xmlns:p14="http://schemas.microsoft.com/office/powerpoint/2010/main" val="3272032720"/>
+      </p:ext>
+    </p:extLst>
+  </p:cSld>
+  <p:clrMapOvr>
+    <a:masterClrMapping/>
+  </p:clrMapOvr>
+  <p:timing>
+    <p:tnLst>
+      <p:par>
+        <p:cTn id="1" dur="indefinite" restart="never" nodeType="tmRoot"/>
+      </p:par>
+    </p:tnLst>
+  </p:timing>
+</p:sld>
+</file>
+
+<file path=ppt/slides/slide23.xml><?xml version="1.0" encoding="utf-8"?>
+<p:sld xmlns:a="http://schemas.openxmlformats.org/drawingml/2006/main" xmlns:r="http://schemas.openxmlformats.org/officeDocument/2006/relationships" xmlns:p="http://schemas.openxmlformats.org/presentationml/2006/main">
+  <p:cSld>
+    <p:spTree>
+      <p:nvGrpSpPr>
+        <p:cNvPr id="1" name=""/>
+        <p:cNvGrpSpPr/>
+        <p:nvPr/>
+      </p:nvGrpSpPr>
+      <p:grpSpPr>
+        <a:xfrm>
+          <a:off x="0" y="0"/>
+          <a:ext cx="0" cy="0"/>
+          <a:chOff x="0" y="0"/>
+          <a:chExt cx="0" cy="0"/>
+        </a:xfrm>
+      </p:grpSpPr>
+      <p:sp>
+        <p:nvSpPr>
+          <p:cNvPr id="2" name="Title 1"/>
+          <p:cNvSpPr>
+            <a:spLocks noGrp="1"/>
+          </p:cNvSpPr>
+          <p:nvPr>
+            <p:ph type="title"/>
+          </p:nvPr>
+        </p:nvSpPr>
+        <p:spPr/>
+        <p:txBody>
+          <a:bodyPr/>
+          <a:lstStyle/>
+          <a:p>
+            <a:r>
+              <a:rPr lang="en-US" dirty="0" smtClean="0"/>
+              <a:t>Accessibility</a:t>
+            </a:r>
+            <a:endParaRPr lang="en-US" dirty="0"/>
+          </a:p>
+        </p:txBody>
+      </p:sp>
+      <p:sp>
+        <p:nvSpPr>
+          <p:cNvPr id="3" name="Text Placeholder 2"/>
+          <p:cNvSpPr>
+            <a:spLocks noGrp="1"/>
+          </p:cNvSpPr>
+          <p:nvPr>
+            <p:ph type="body" idx="1"/>
+          </p:nvPr>
+        </p:nvSpPr>
+        <p:spPr/>
+        <p:txBody>
+          <a:bodyPr/>
+          <a:lstStyle/>
+          <a:p>
+            <a:pPr marL="285750" indent="-285750">
+              <a:buFont typeface="Arial" panose="020B0604020202020204" pitchFamily="34" charset="0"/>
+              <a:buChar char="•"/>
+            </a:pPr>
+            <a:r>
+              <a:rPr lang="en-US" dirty="0" smtClean="0"/>
+              <a:t>Easily accessible from local network</a:t>
+            </a:r>
+          </a:p>
+          <a:p>
+            <a:pPr marL="285750" indent="-285750">
+              <a:buFont typeface="Arial" panose="020B0604020202020204" pitchFamily="34" charset="0"/>
+              <a:buChar char="•"/>
+            </a:pPr>
+            <a:r>
+              <a:rPr lang="en-US" dirty="0" smtClean="0"/>
+              <a:t>Possible to access from outside the network if enabled and properly secured. </a:t>
+            </a:r>
+            <a:endParaRPr lang="en-US" dirty="0"/>
+          </a:p>
+        </p:txBody>
+      </p:sp>
+      <p:pic>
+        <p:nvPicPr>
+          <p:cNvPr id="5" name="Picture 4"/>
+          <p:cNvPicPr>
+            <a:picLocks noChangeAspect="1"/>
+          </p:cNvPicPr>
+          <p:nvPr/>
+        </p:nvPicPr>
+        <p:blipFill>
+          <a:blip r:embed="rId2">
+            <a:extLst>
+              <a:ext uri="{28A0092B-C50C-407E-A947-70E740481C1C}">
+                <a14:useLocalDpi xmlns:a14="http://schemas.microsoft.com/office/drawing/2010/main" val="0"/>
+              </a:ext>
+            </a:extLst>
+          </a:blip>
+          <a:stretch>
+            <a:fillRect/>
+          </a:stretch>
+        </p:blipFill>
+        <p:spPr>
+          <a:xfrm>
+            <a:off x="8137237" y="1446014"/>
+            <a:ext cx="2438400" cy="2438400"/>
+          </a:xfrm>
+          <a:prstGeom prst="rect">
+            <a:avLst/>
+          </a:prstGeom>
+        </p:spPr>
+      </p:pic>
+    </p:spTree>
+    <p:extLst>
+      <p:ext uri="{BB962C8B-B14F-4D97-AF65-F5344CB8AC3E}">
+        <p14:creationId xmlns:p14="http://schemas.microsoft.com/office/powerpoint/2010/main" val="229988357"/>
+      </p:ext>
+    </p:extLst>
+  </p:cSld>
+  <p:clrMapOvr>
+    <a:masterClrMapping/>
+  </p:clrMapOvr>
+  <p:timing>
+    <p:tnLst>
+      <p:par>
+        <p:cTn id="1" dur="indefinite" restart="never" nodeType="tmRoot"/>
+      </p:par>
+    </p:tnLst>
+  </p:timing>
+</p:sld>
+</file>
+
+<file path=ppt/slides/slide24.xml><?xml version="1.0" encoding="utf-8"?>
+<p:sld xmlns:a="http://schemas.openxmlformats.org/drawingml/2006/main" xmlns:r="http://schemas.openxmlformats.org/officeDocument/2006/relationships" xmlns:p="http://schemas.openxmlformats.org/presentationml/2006/main">
+  <p:cSld>
+    <p:spTree>
+      <p:nvGrpSpPr>
+        <p:cNvPr id="1" name=""/>
+        <p:cNvGrpSpPr/>
+        <p:nvPr/>
+      </p:nvGrpSpPr>
+      <p:grpSpPr>
+        <a:xfrm>
+          <a:off x="0" y="0"/>
+          <a:ext cx="0" cy="0"/>
+          <a:chOff x="0" y="0"/>
+          <a:chExt cx="0" cy="0"/>
+        </a:xfrm>
+      </p:grpSpPr>
+      <p:sp>
+        <p:nvSpPr>
+          <p:cNvPr id="5" name="Title 4"/>
+          <p:cNvSpPr>
+            <a:spLocks noGrp="1"/>
+          </p:cNvSpPr>
+          <p:nvPr>
+            <p:ph type="title"/>
+          </p:nvPr>
+        </p:nvSpPr>
+        <p:spPr/>
+        <p:txBody>
+          <a:bodyPr/>
+          <a:lstStyle/>
+          <a:p>
+            <a:r>
+              <a:rPr lang="en-CA" b="0" dirty="0" smtClean="0"/>
+              <a:t>The</a:t>
+            </a:r>
+            <a:r>
+              <a:rPr lang="en-CA" dirty="0" smtClean="0"/>
+              <a:t> Details</a:t>
+            </a:r>
             <a:endParaRPr lang="en-CA" dirty="0"/>
           </a:p>
         </p:txBody>
@@ -12231,7 +13070,7 @@
 </p:sld>
 </file>
 
-<file path=ppt/slides/slide21.xml><?xml version="1.0" encoding="utf-8"?>
+<file path=ppt/slides/slide25.xml><?xml version="1.0" encoding="utf-8"?>
 <p:sld xmlns:a="http://schemas.openxmlformats.org/drawingml/2006/main" xmlns:r="http://schemas.openxmlformats.org/officeDocument/2006/relationships" xmlns:p="http://schemas.openxmlformats.org/presentationml/2006/main">
   <p:cSld>
     <p:spTree>
@@ -12379,7 +13218,7 @@
         </p:blipFill>
         <p:spPr>
           <a:xfrm>
-            <a:off x="7495323" y="3268899"/>
+            <a:off x="7615396" y="3430456"/>
             <a:ext cx="2867786" cy="1243929"/>
           </a:xfrm>
           <a:prstGeom prst="roundRect">
@@ -12465,7 +13304,7 @@
         </p:blipFill>
         <p:spPr>
           <a:xfrm>
-            <a:off x="8051998" y="5180222"/>
+            <a:off x="7747198" y="5148720"/>
             <a:ext cx="2311111" cy="1095238"/>
           </a:xfrm>
           <a:prstGeom prst="roundRect">
@@ -12572,483 +13411,16 @@
           </a:effectLst>
         </p:spPr>
       </p:pic>
-    </p:spTree>
-    <p:extLst>
-      <p:ext uri="{BB962C8B-B14F-4D97-AF65-F5344CB8AC3E}">
-        <p14:creationId xmlns:p14="http://schemas.microsoft.com/office/powerpoint/2010/main" val="1968001618"/>
-      </p:ext>
-    </p:extLst>
-  </p:cSld>
-  <p:clrMapOvr>
-    <a:masterClrMapping/>
-  </p:clrMapOvr>
-  <p:timing>
-    <p:tnLst>
-      <p:par>
-        <p:cTn id="1" dur="indefinite" restart="never" nodeType="tmRoot"/>
-      </p:par>
-    </p:tnLst>
-  </p:timing>
-</p:sld>
-</file>
-
-<file path=ppt/slides/slide22.xml><?xml version="1.0" encoding="utf-8"?>
-<p:sld xmlns:a="http://schemas.openxmlformats.org/drawingml/2006/main" xmlns:r="http://schemas.openxmlformats.org/officeDocument/2006/relationships" xmlns:p="http://schemas.openxmlformats.org/presentationml/2006/main">
-  <p:cSld>
-    <p:spTree>
-      <p:nvGrpSpPr>
-        <p:cNvPr id="1" name=""/>
-        <p:cNvGrpSpPr/>
-        <p:nvPr/>
-      </p:nvGrpSpPr>
-      <p:grpSpPr>
-        <a:xfrm>
-          <a:off x="0" y="0"/>
-          <a:ext cx="0" cy="0"/>
-          <a:chOff x="0" y="0"/>
-          <a:chExt cx="0" cy="0"/>
-        </a:xfrm>
-      </p:grpSpPr>
-      <p:sp>
-        <p:nvSpPr>
-          <p:cNvPr id="2" name="Title 1"/>
-          <p:cNvSpPr>
-            <a:spLocks noGrp="1"/>
-          </p:cNvSpPr>
-          <p:nvPr>
-            <p:ph type="title"/>
-          </p:nvPr>
-        </p:nvSpPr>
-        <p:spPr/>
-        <p:txBody>
-          <a:bodyPr/>
-          <a:lstStyle/>
-          <a:p>
-            <a:r>
-              <a:rPr lang="en-CA" smtClean="0"/>
-              <a:t>User view</a:t>
-            </a:r>
-            <a:endParaRPr lang="en-CA" dirty="0"/>
-          </a:p>
-        </p:txBody>
-      </p:sp>
-      <p:sp>
-        <p:nvSpPr>
-          <p:cNvPr id="4" name="Content Placeholder 3"/>
-          <p:cNvSpPr>
-            <a:spLocks noGrp="1"/>
-          </p:cNvSpPr>
-          <p:nvPr>
-            <p:ph idx="1"/>
-          </p:nvPr>
-        </p:nvSpPr>
-        <p:spPr/>
-        <p:txBody>
-          <a:bodyPr/>
-          <a:lstStyle/>
-          <a:p>
-            <a:r>
-              <a:rPr lang="en-CA" dirty="0" smtClean="0"/>
-              <a:t>Written in C# on .NET 4.5</a:t>
-            </a:r>
-          </a:p>
-          <a:p>
-            <a:r>
-              <a:rPr lang="en-CA" dirty="0" smtClean="0"/>
-              <a:t>Windows Forms as the GUI Toolkit</a:t>
-            </a:r>
-          </a:p>
-          <a:p>
-            <a:r>
-              <a:rPr lang="en-CA" dirty="0" smtClean="0"/>
-              <a:t>Portable onto any computer that can use .NET 4.5</a:t>
-            </a:r>
-          </a:p>
-          <a:p>
-            <a:r>
-              <a:rPr lang="en-CA" dirty="0" smtClean="0"/>
-              <a:t>SQLite 3 as a database backend</a:t>
-            </a:r>
-          </a:p>
-          <a:p>
-            <a:r>
-              <a:rPr lang="en-CA" dirty="0" smtClean="0"/>
-              <a:t>Requires System.Data.SQLite.dll- a .NET library for managing SQLite databases</a:t>
-            </a:r>
-          </a:p>
-          <a:p>
-            <a:endParaRPr lang="en-CA" dirty="0"/>
-          </a:p>
-        </p:txBody>
-      </p:sp>
-    </p:spTree>
-    <p:extLst>
-      <p:ext uri="{BB962C8B-B14F-4D97-AF65-F5344CB8AC3E}">
-        <p14:creationId xmlns:p14="http://schemas.microsoft.com/office/powerpoint/2010/main" val="1866130611"/>
-      </p:ext>
-    </p:extLst>
-  </p:cSld>
-  <p:clrMapOvr>
-    <a:masterClrMapping/>
-  </p:clrMapOvr>
-  <p:timing>
-    <p:tnLst>
-      <p:par>
-        <p:cTn id="1" dur="indefinite" restart="never" nodeType="tmRoot"/>
-      </p:par>
-    </p:tnLst>
-  </p:timing>
-</p:sld>
-</file>
-
-<file path=ppt/slides/slide23.xml><?xml version="1.0" encoding="utf-8"?>
-<p:sld xmlns:a="http://schemas.openxmlformats.org/drawingml/2006/main" xmlns:r="http://schemas.openxmlformats.org/officeDocument/2006/relationships" xmlns:p="http://schemas.openxmlformats.org/presentationml/2006/main">
-  <p:cSld>
-    <p:spTree>
-      <p:nvGrpSpPr>
-        <p:cNvPr id="1" name=""/>
-        <p:cNvGrpSpPr/>
-        <p:nvPr/>
-      </p:nvGrpSpPr>
-      <p:grpSpPr>
-        <a:xfrm>
-          <a:off x="0" y="0"/>
-          <a:ext cx="0" cy="0"/>
-          <a:chOff x="0" y="0"/>
-          <a:chExt cx="0" cy="0"/>
-        </a:xfrm>
-      </p:grpSpPr>
-      <p:sp>
-        <p:nvSpPr>
-          <p:cNvPr id="2" name="Title 1"/>
-          <p:cNvSpPr>
-            <a:spLocks noGrp="1"/>
-          </p:cNvSpPr>
-          <p:nvPr>
-            <p:ph type="title"/>
-          </p:nvPr>
-        </p:nvSpPr>
-        <p:spPr/>
-        <p:txBody>
-          <a:bodyPr/>
-          <a:lstStyle/>
-          <a:p>
-            <a:r>
-              <a:rPr lang="en-CA" dirty="0" err="1" smtClean="0"/>
-              <a:t>Secure.cs</a:t>
-            </a:r>
-            <a:endParaRPr lang="en-CA" dirty="0"/>
-          </a:p>
-        </p:txBody>
-      </p:sp>
-      <p:sp>
-        <p:nvSpPr>
-          <p:cNvPr id="3" name="Content Placeholder 2"/>
-          <p:cNvSpPr>
-            <a:spLocks noGrp="1"/>
-          </p:cNvSpPr>
-          <p:nvPr>
-            <p:ph idx="1"/>
-          </p:nvPr>
-        </p:nvSpPr>
-        <p:spPr/>
-        <p:txBody>
-          <a:bodyPr/>
-          <a:lstStyle/>
-          <a:p>
-            <a:r>
-              <a:rPr lang="en-CA" dirty="0" smtClean="0"/>
-              <a:t>Hashes all passwords on entry into the program- administrators nor database has access to </a:t>
-            </a:r>
-            <a:r>
-              <a:rPr lang="en-CA" dirty="0" err="1" smtClean="0"/>
-              <a:t>unhashed</a:t>
-            </a:r>
-            <a:r>
-              <a:rPr lang="en-CA" dirty="0" smtClean="0"/>
-              <a:t> passwords</a:t>
-            </a:r>
-          </a:p>
-          <a:p>
-            <a:r>
-              <a:rPr lang="en-CA" dirty="0" smtClean="0"/>
-              <a:t>Uses SHA-512 (generation SHA-2), giving secure hashing while maintain reasonably fast performance (99 </a:t>
-            </a:r>
-            <a:r>
-              <a:rPr lang="en-CA" dirty="0" err="1" smtClean="0"/>
-              <a:t>MiB</a:t>
-            </a:r>
-            <a:r>
-              <a:rPr lang="en-CA" dirty="0" smtClean="0"/>
-              <a:t>/s)</a:t>
-            </a:r>
-          </a:p>
-          <a:p>
-            <a:r>
-              <a:rPr lang="en-CA" dirty="0" smtClean="0"/>
-              <a:t>Does not salt hashes, so still vulnerable to rainbow table- however risk deemed low enough to be acceptable</a:t>
-            </a:r>
-          </a:p>
-          <a:p>
-            <a:r>
-              <a:rPr lang="en-CA" dirty="0" smtClean="0"/>
-              <a:t>Wonderfully simple! Built-in libraries provide readable code</a:t>
-            </a:r>
-            <a:endParaRPr lang="en-CA" dirty="0"/>
-          </a:p>
-        </p:txBody>
-      </p:sp>
-    </p:spTree>
-    <p:extLst>
-      <p:ext uri="{BB962C8B-B14F-4D97-AF65-F5344CB8AC3E}">
-        <p14:creationId xmlns:p14="http://schemas.microsoft.com/office/powerpoint/2010/main" val="1904071082"/>
-      </p:ext>
-    </p:extLst>
-  </p:cSld>
-  <p:clrMapOvr>
-    <a:masterClrMapping/>
-  </p:clrMapOvr>
-  <p:timing>
-    <p:tnLst>
-      <p:par>
-        <p:cTn id="1" dur="indefinite" restart="never" nodeType="tmRoot"/>
-      </p:par>
-    </p:tnLst>
-  </p:timing>
-</p:sld>
-</file>
-
-<file path=ppt/slides/slide24.xml><?xml version="1.0" encoding="utf-8"?>
-<p:sld xmlns:a="http://schemas.openxmlformats.org/drawingml/2006/main" xmlns:r="http://schemas.openxmlformats.org/officeDocument/2006/relationships" xmlns:p="http://schemas.openxmlformats.org/presentationml/2006/main">
-  <p:cSld>
-    <p:spTree>
-      <p:nvGrpSpPr>
-        <p:cNvPr id="1" name=""/>
-        <p:cNvGrpSpPr/>
-        <p:nvPr/>
-      </p:nvGrpSpPr>
-      <p:grpSpPr>
-        <a:xfrm>
-          <a:off x="0" y="0"/>
-          <a:ext cx="0" cy="0"/>
-          <a:chOff x="0" y="0"/>
-          <a:chExt cx="0" cy="0"/>
-        </a:xfrm>
-      </p:grpSpPr>
-      <p:sp>
-        <p:nvSpPr>
-          <p:cNvPr id="2" name="Title 1"/>
-          <p:cNvSpPr>
-            <a:spLocks noGrp="1"/>
-          </p:cNvSpPr>
-          <p:nvPr>
-            <p:ph type="title"/>
-          </p:nvPr>
-        </p:nvSpPr>
-        <p:spPr/>
-        <p:txBody>
-          <a:bodyPr/>
-          <a:lstStyle/>
-          <a:p>
-            <a:r>
-              <a:rPr lang="en-CA" dirty="0" err="1" smtClean="0"/>
-              <a:t>DatabaseConnection.cs</a:t>
-            </a:r>
-            <a:endParaRPr lang="en-CA" dirty="0"/>
-          </a:p>
-        </p:txBody>
-      </p:sp>
-      <p:sp>
-        <p:nvSpPr>
-          <p:cNvPr id="3" name="Content Placeholder 2"/>
-          <p:cNvSpPr>
-            <a:spLocks noGrp="1"/>
-          </p:cNvSpPr>
-          <p:nvPr>
-            <p:ph idx="1"/>
-          </p:nvPr>
-        </p:nvSpPr>
-        <p:spPr/>
-        <p:txBody>
-          <a:bodyPr/>
-          <a:lstStyle/>
-          <a:p>
-            <a:r>
-              <a:rPr lang="en-CA" dirty="0" smtClean="0"/>
-              <a:t>Wrapper class for </a:t>
-            </a:r>
-            <a:r>
-              <a:rPr lang="en-CA" dirty="0" err="1" smtClean="0"/>
-              <a:t>System.Data.SQLite</a:t>
-            </a:r>
-            <a:endParaRPr lang="en-CA" dirty="0" smtClean="0"/>
-          </a:p>
-          <a:p>
-            <a:r>
-              <a:rPr lang="en-CA" dirty="0" smtClean="0"/>
-              <a:t>Provides atomic queries and updates to the host table, cutting down on record locking</a:t>
-            </a:r>
-          </a:p>
-        </p:txBody>
-      </p:sp>
-    </p:spTree>
-    <p:extLst>
-      <p:ext uri="{BB962C8B-B14F-4D97-AF65-F5344CB8AC3E}">
-        <p14:creationId xmlns:p14="http://schemas.microsoft.com/office/powerpoint/2010/main" val="2872171304"/>
-      </p:ext>
-    </p:extLst>
-  </p:cSld>
-  <p:clrMapOvr>
-    <a:masterClrMapping/>
-  </p:clrMapOvr>
-  <p:timing>
-    <p:tnLst>
-      <p:par>
-        <p:cTn id="1" dur="indefinite" restart="never" nodeType="tmRoot"/>
-      </p:par>
-    </p:tnLst>
-  </p:timing>
-</p:sld>
-</file>
-
-<file path=ppt/slides/slide25.xml><?xml version="1.0" encoding="utf-8"?>
-<p:sld xmlns:a="http://schemas.openxmlformats.org/drawingml/2006/main" xmlns:r="http://schemas.openxmlformats.org/officeDocument/2006/relationships" xmlns:p="http://schemas.openxmlformats.org/presentationml/2006/main">
-  <p:cSld>
-    <p:spTree>
-      <p:nvGrpSpPr>
-        <p:cNvPr id="1" name=""/>
-        <p:cNvGrpSpPr/>
-        <p:nvPr/>
-      </p:nvGrpSpPr>
-      <p:grpSpPr>
-        <a:xfrm>
-          <a:off x="0" y="0"/>
-          <a:ext cx="0" cy="0"/>
-          <a:chOff x="0" y="0"/>
-          <a:chExt cx="0" cy="0"/>
-        </a:xfrm>
-      </p:grpSpPr>
-      <p:sp>
-        <p:nvSpPr>
-          <p:cNvPr id="2" name="Title 1"/>
-          <p:cNvSpPr>
-            <a:spLocks noGrp="1"/>
-          </p:cNvSpPr>
-          <p:nvPr>
-            <p:ph type="title"/>
-          </p:nvPr>
-        </p:nvSpPr>
-        <p:spPr/>
-        <p:txBody>
-          <a:bodyPr/>
-          <a:lstStyle/>
-          <a:p>
-            <a:r>
-              <a:rPr lang="en-CA" dirty="0" smtClean="0"/>
-              <a:t>Version Control</a:t>
-            </a:r>
-            <a:endParaRPr lang="en-CA" dirty="0"/>
-          </a:p>
-        </p:txBody>
-      </p:sp>
-      <p:sp>
-        <p:nvSpPr>
-          <p:cNvPr id="10" name="Content Placeholder 9"/>
-          <p:cNvSpPr>
-            <a:spLocks noGrp="1"/>
-          </p:cNvSpPr>
-          <p:nvPr>
-            <p:ph sz="half" idx="2"/>
-          </p:nvPr>
-        </p:nvSpPr>
-        <p:spPr>
-          <a:xfrm>
-            <a:off x="814729" y="2351314"/>
-            <a:ext cx="5189856" cy="3509737"/>
-          </a:xfrm>
-        </p:spPr>
-        <p:txBody>
-          <a:bodyPr/>
-          <a:lstStyle/>
-          <a:p>
-            <a:r>
-              <a:rPr lang="en-CA" dirty="0" err="1" smtClean="0"/>
-              <a:t>GitHub</a:t>
-            </a:r>
-            <a:r>
-              <a:rPr lang="en-CA" dirty="0" smtClean="0"/>
-              <a:t> allowed the programmers to download, update, sync and merge the source</a:t>
-            </a:r>
-          </a:p>
-          <a:p>
-            <a:r>
-              <a:rPr lang="en-CA" dirty="0" smtClean="0"/>
-              <a:t>No worries about outdated source code</a:t>
-            </a:r>
-          </a:p>
-          <a:p>
-            <a:r>
-              <a:rPr lang="en-CA" dirty="0" smtClean="0"/>
-              <a:t>Automatic reversion history, rollback at any time</a:t>
-            </a:r>
-          </a:p>
-          <a:p>
-            <a:r>
-              <a:rPr lang="en-CA" dirty="0" smtClean="0"/>
-              <a:t>Issue creation and tracking</a:t>
-            </a:r>
-          </a:p>
-          <a:p>
-            <a:r>
-              <a:rPr lang="en-CA" dirty="0" err="1" smtClean="0"/>
-              <a:t>GitHub</a:t>
-            </a:r>
-            <a:r>
-              <a:rPr lang="en-CA" dirty="0" smtClean="0"/>
-              <a:t> is great- use it</a:t>
-            </a:r>
-          </a:p>
-        </p:txBody>
-      </p:sp>
-      <p:sp>
-        <p:nvSpPr>
-          <p:cNvPr id="11" name="Text Placeholder 10"/>
-          <p:cNvSpPr>
-            <a:spLocks noGrp="1"/>
-          </p:cNvSpPr>
-          <p:nvPr>
-            <p:ph type="body" sz="quarter" idx="3"/>
-          </p:nvPr>
-        </p:nvSpPr>
-        <p:spPr/>
-        <p:txBody>
-          <a:bodyPr/>
-          <a:lstStyle/>
-          <a:p>
-            <a:r>
-              <a:rPr lang="en-CA" dirty="0" smtClean="0"/>
-              <a:t>Git implemented by </a:t>
-            </a:r>
-            <a:r>
-              <a:rPr lang="en-CA" dirty="0" err="1" smtClean="0"/>
-              <a:t>GitHub</a:t>
-            </a:r>
-            <a:endParaRPr lang="en-CA" dirty="0"/>
-          </a:p>
-        </p:txBody>
-      </p:sp>
       <p:pic>
         <p:nvPicPr>
-          <p:cNvPr id="13" name="Content Placeholder 12"/>
+          <p:cNvPr id="3" name="Picture 2"/>
           <p:cNvPicPr>
-            <a:picLocks noGrp="1" noChangeAspect="1"/>
+            <a:picLocks noChangeAspect="1"/>
           </p:cNvPicPr>
-          <p:nvPr>
-            <p:ph sz="quarter" idx="4"/>
-          </p:nvPr>
+          <p:nvPr/>
         </p:nvPicPr>
         <p:blipFill>
-          <a:blip r:embed="rId2">
+          <a:blip r:embed="rId9">
             <a:extLst>
               <a:ext uri="{28A0092B-C50C-407E-A947-70E740481C1C}">
                 <a14:useLocalDpi xmlns:a14="http://schemas.microsoft.com/office/drawing/2010/main" val="0"/>
@@ -13061,15 +13433,24 @@
         </p:blipFill>
         <p:spPr>
           <a:xfrm>
-            <a:off x="7261225" y="3634581"/>
-            <a:ext cx="3048000" cy="1343025"/>
+            <a:off x="6753715" y="2072080"/>
+            <a:ext cx="3046558" cy="748620"/>
           </a:xfrm>
+          <a:prstGeom prst="rect">
+            <a:avLst/>
+          </a:prstGeom>
+          <a:ln>
+            <a:noFill/>
+          </a:ln>
+          <a:effectLst>
+            <a:reflection blurRad="12700" stA="38000" endPos="38500" dist="5080" dir="5400000" sy="-100000" algn="bl" rotWithShape="0"/>
+          </a:effectLst>
         </p:spPr>
       </p:pic>
     </p:spTree>
     <p:extLst>
       <p:ext uri="{BB962C8B-B14F-4D97-AF65-F5344CB8AC3E}">
-        <p14:creationId xmlns:p14="http://schemas.microsoft.com/office/powerpoint/2010/main" val="1675094306"/>
+        <p14:creationId xmlns:p14="http://schemas.microsoft.com/office/powerpoint/2010/main" val="1968001618"/>
       </p:ext>
     </p:extLst>
   </p:cSld>
@@ -13105,7 +13486,7 @@
       </p:grpSpPr>
       <p:sp>
         <p:nvSpPr>
-          <p:cNvPr id="7" name="Title 6"/>
+          <p:cNvPr id="2" name="Title 1"/>
           <p:cNvSpPr>
             <a:spLocks noGrp="1"/>
           </p:cNvSpPr>
@@ -13119,8 +13500,8 @@
           <a:lstStyle/>
           <a:p>
             <a:r>
-              <a:rPr lang="en-CA" dirty="0" smtClean="0"/>
-              <a:t>This slide for Gary</a:t>
+              <a:rPr lang="en-CA" smtClean="0"/>
+              <a:t>User view</a:t>
             </a:r>
             <a:endParaRPr lang="en-CA" dirty="0"/>
           </a:p>
@@ -13128,12 +13509,12 @@
       </p:sp>
       <p:sp>
         <p:nvSpPr>
-          <p:cNvPr id="8" name="Text Placeholder 7"/>
+          <p:cNvPr id="4" name="Content Placeholder 3"/>
           <p:cNvSpPr>
             <a:spLocks noGrp="1"/>
           </p:cNvSpPr>
           <p:nvPr>
-            <p:ph type="body" sz="quarter" idx="16"/>
+            <p:ph idx="1"/>
           </p:nvPr>
         </p:nvSpPr>
         <p:spPr/>
@@ -13143,8 +13524,34 @@
           <a:p>
             <a:r>
               <a:rPr lang="en-CA" dirty="0" smtClean="0"/>
-              <a:t>Put details about your application here</a:t>
-            </a:r>
+              <a:t>Written in C# on .NET 4.5</a:t>
+            </a:r>
+          </a:p>
+          <a:p>
+            <a:r>
+              <a:rPr lang="en-CA" dirty="0" smtClean="0"/>
+              <a:t>Windows Forms as the GUI Toolkit</a:t>
+            </a:r>
+          </a:p>
+          <a:p>
+            <a:r>
+              <a:rPr lang="en-CA" dirty="0" smtClean="0"/>
+              <a:t>Portable onto any computer that can use .NET 4.5</a:t>
+            </a:r>
+          </a:p>
+          <a:p>
+            <a:r>
+              <a:rPr lang="en-CA" dirty="0" smtClean="0"/>
+              <a:t>SQLite 3 as a database backend</a:t>
+            </a:r>
+          </a:p>
+          <a:p>
+            <a:r>
+              <a:rPr lang="en-CA" dirty="0" smtClean="0"/>
+              <a:t>Requires System.Data.SQLite.dll- a .NET library for managing SQLite databases</a:t>
+            </a:r>
+          </a:p>
+          <a:p>
             <a:endParaRPr lang="en-CA" dirty="0"/>
           </a:p>
         </p:txBody>
@@ -13152,7 +13559,392 @@
     </p:spTree>
     <p:extLst>
       <p:ext uri="{BB962C8B-B14F-4D97-AF65-F5344CB8AC3E}">
-        <p14:creationId xmlns:p14="http://schemas.microsoft.com/office/powerpoint/2010/main" val="1957444962"/>
+        <p14:creationId xmlns:p14="http://schemas.microsoft.com/office/powerpoint/2010/main" val="1866130611"/>
+      </p:ext>
+    </p:extLst>
+  </p:cSld>
+  <p:clrMapOvr>
+    <a:masterClrMapping/>
+  </p:clrMapOvr>
+  <p:timing>
+    <p:tnLst>
+      <p:par>
+        <p:cTn id="1" dur="indefinite" restart="never" nodeType="tmRoot"/>
+      </p:par>
+    </p:tnLst>
+  </p:timing>
+</p:sld>
+</file>
+
+<file path=ppt/slides/slide27.xml><?xml version="1.0" encoding="utf-8"?>
+<p:sld xmlns:a="http://schemas.openxmlformats.org/drawingml/2006/main" xmlns:r="http://schemas.openxmlformats.org/officeDocument/2006/relationships" xmlns:p="http://schemas.openxmlformats.org/presentationml/2006/main">
+  <p:cSld>
+    <p:spTree>
+      <p:nvGrpSpPr>
+        <p:cNvPr id="1" name=""/>
+        <p:cNvGrpSpPr/>
+        <p:nvPr/>
+      </p:nvGrpSpPr>
+      <p:grpSpPr>
+        <a:xfrm>
+          <a:off x="0" y="0"/>
+          <a:ext cx="0" cy="0"/>
+          <a:chOff x="0" y="0"/>
+          <a:chExt cx="0" cy="0"/>
+        </a:xfrm>
+      </p:grpSpPr>
+      <p:sp>
+        <p:nvSpPr>
+          <p:cNvPr id="2" name="Title 1"/>
+          <p:cNvSpPr>
+            <a:spLocks noGrp="1"/>
+          </p:cNvSpPr>
+          <p:nvPr>
+            <p:ph type="title"/>
+          </p:nvPr>
+        </p:nvSpPr>
+        <p:spPr/>
+        <p:txBody>
+          <a:bodyPr/>
+          <a:lstStyle/>
+          <a:p>
+            <a:r>
+              <a:rPr lang="en-CA" dirty="0" err="1" smtClean="0"/>
+              <a:t>Secure.cs</a:t>
+            </a:r>
+            <a:r>
+              <a:rPr lang="en-CA" dirty="0" smtClean="0"/>
+              <a:t> &amp; Secure.py</a:t>
+            </a:r>
+            <a:endParaRPr lang="en-CA" dirty="0"/>
+          </a:p>
+        </p:txBody>
+      </p:sp>
+      <p:sp>
+        <p:nvSpPr>
+          <p:cNvPr id="3" name="Content Placeholder 2"/>
+          <p:cNvSpPr>
+            <a:spLocks noGrp="1"/>
+          </p:cNvSpPr>
+          <p:nvPr>
+            <p:ph idx="1"/>
+          </p:nvPr>
+        </p:nvSpPr>
+        <p:spPr/>
+        <p:txBody>
+          <a:bodyPr/>
+          <a:lstStyle/>
+          <a:p>
+            <a:r>
+              <a:rPr lang="en-CA" dirty="0" smtClean="0"/>
+              <a:t>Hashes all passwords on entry into the program- administrators nor database has access to </a:t>
+            </a:r>
+            <a:r>
+              <a:rPr lang="en-CA" dirty="0" err="1" smtClean="0"/>
+              <a:t>unhashed</a:t>
+            </a:r>
+            <a:r>
+              <a:rPr lang="en-CA" dirty="0" smtClean="0"/>
+              <a:t> passwords</a:t>
+            </a:r>
+          </a:p>
+          <a:p>
+            <a:r>
+              <a:rPr lang="en-CA" dirty="0" smtClean="0"/>
+              <a:t>Uses SHA-512 (generation SHA-2), giving secure hashing while maintain reasonably fast performance (99 </a:t>
+            </a:r>
+            <a:r>
+              <a:rPr lang="en-CA" dirty="0" err="1" smtClean="0"/>
+              <a:t>MiB</a:t>
+            </a:r>
+            <a:r>
+              <a:rPr lang="en-CA" dirty="0" smtClean="0"/>
+              <a:t>/s)</a:t>
+            </a:r>
+          </a:p>
+          <a:p>
+            <a:r>
+              <a:rPr lang="en-CA" dirty="0" smtClean="0"/>
+              <a:t>Does not salt hashes, so still vulnerable to rainbow table- however risk deemed low enough to be acceptable</a:t>
+            </a:r>
+          </a:p>
+          <a:p>
+            <a:r>
+              <a:rPr lang="en-CA" dirty="0" smtClean="0"/>
+              <a:t>Wonderfully simple! Built-in libraries provide readable code</a:t>
+            </a:r>
+            <a:endParaRPr lang="en-CA" dirty="0"/>
+          </a:p>
+        </p:txBody>
+      </p:sp>
+    </p:spTree>
+    <p:extLst>
+      <p:ext uri="{BB962C8B-B14F-4D97-AF65-F5344CB8AC3E}">
+        <p14:creationId xmlns:p14="http://schemas.microsoft.com/office/powerpoint/2010/main" val="1904071082"/>
+      </p:ext>
+    </p:extLst>
+  </p:cSld>
+  <p:clrMapOvr>
+    <a:masterClrMapping/>
+  </p:clrMapOvr>
+  <p:timing>
+    <p:tnLst>
+      <p:par>
+        <p:cTn id="1" dur="indefinite" restart="never" nodeType="tmRoot"/>
+      </p:par>
+    </p:tnLst>
+  </p:timing>
+</p:sld>
+</file>
+
+<file path=ppt/slides/slide28.xml><?xml version="1.0" encoding="utf-8"?>
+<p:sld xmlns:a="http://schemas.openxmlformats.org/drawingml/2006/main" xmlns:r="http://schemas.openxmlformats.org/officeDocument/2006/relationships" xmlns:p="http://schemas.openxmlformats.org/presentationml/2006/main">
+  <p:cSld>
+    <p:spTree>
+      <p:nvGrpSpPr>
+        <p:cNvPr id="1" name=""/>
+        <p:cNvGrpSpPr/>
+        <p:nvPr/>
+      </p:nvGrpSpPr>
+      <p:grpSpPr>
+        <a:xfrm>
+          <a:off x="0" y="0"/>
+          <a:ext cx="0" cy="0"/>
+          <a:chOff x="0" y="0"/>
+          <a:chExt cx="0" cy="0"/>
+        </a:xfrm>
+      </p:grpSpPr>
+      <p:sp>
+        <p:nvSpPr>
+          <p:cNvPr id="2" name="Title 1"/>
+          <p:cNvSpPr>
+            <a:spLocks noGrp="1"/>
+          </p:cNvSpPr>
+          <p:nvPr>
+            <p:ph type="title"/>
+          </p:nvPr>
+        </p:nvSpPr>
+        <p:spPr/>
+        <p:txBody>
+          <a:bodyPr/>
+          <a:lstStyle/>
+          <a:p>
+            <a:r>
+              <a:rPr lang="en-CA" dirty="0" err="1" smtClean="0"/>
+              <a:t>DatabaseConnection.cs</a:t>
+            </a:r>
+            <a:r>
+              <a:rPr lang="en-CA" dirty="0" smtClean="0"/>
+              <a:t> &amp; dbinterface.py</a:t>
+            </a:r>
+            <a:endParaRPr lang="en-CA" dirty="0"/>
+          </a:p>
+        </p:txBody>
+      </p:sp>
+      <p:sp>
+        <p:nvSpPr>
+          <p:cNvPr id="3" name="Content Placeholder 2"/>
+          <p:cNvSpPr>
+            <a:spLocks noGrp="1"/>
+          </p:cNvSpPr>
+          <p:nvPr>
+            <p:ph idx="1"/>
+          </p:nvPr>
+        </p:nvSpPr>
+        <p:spPr/>
+        <p:txBody>
+          <a:bodyPr/>
+          <a:lstStyle/>
+          <a:p>
+            <a:r>
+              <a:rPr lang="en-CA" dirty="0" smtClean="0"/>
+              <a:t>Wrapper class for </a:t>
+            </a:r>
+            <a:r>
+              <a:rPr lang="en-CA" dirty="0" err="1" smtClean="0"/>
+              <a:t>System.Data.SQLite</a:t>
+            </a:r>
+            <a:r>
+              <a:rPr lang="en-CA" dirty="0" smtClean="0"/>
+              <a:t> &amp; Sqlite3, respectively</a:t>
+            </a:r>
+            <a:endParaRPr lang="en-CA" dirty="0" smtClean="0"/>
+          </a:p>
+          <a:p>
+            <a:r>
+              <a:rPr lang="en-CA" dirty="0" smtClean="0"/>
+              <a:t>Provides atomic queries and updates to the host table, cutting down on record </a:t>
+            </a:r>
+            <a:r>
+              <a:rPr lang="en-CA" dirty="0" smtClean="0"/>
+              <a:t>locking</a:t>
+            </a:r>
+          </a:p>
+          <a:p>
+            <a:r>
+              <a:rPr lang="en-CA" dirty="0" smtClean="0"/>
+              <a:t>Uses parameterized SQL in order to avoid possibility of SQL injection attacks.</a:t>
+            </a:r>
+            <a:endParaRPr lang="en-CA" dirty="0" smtClean="0"/>
+          </a:p>
+        </p:txBody>
+      </p:sp>
+    </p:spTree>
+    <p:extLst>
+      <p:ext uri="{BB962C8B-B14F-4D97-AF65-F5344CB8AC3E}">
+        <p14:creationId xmlns:p14="http://schemas.microsoft.com/office/powerpoint/2010/main" val="2872171304"/>
+      </p:ext>
+    </p:extLst>
+  </p:cSld>
+  <p:clrMapOvr>
+    <a:masterClrMapping/>
+  </p:clrMapOvr>
+  <p:timing>
+    <p:tnLst>
+      <p:par>
+        <p:cTn id="1" dur="indefinite" restart="never" nodeType="tmRoot"/>
+      </p:par>
+    </p:tnLst>
+  </p:timing>
+</p:sld>
+</file>
+
+<file path=ppt/slides/slide29.xml><?xml version="1.0" encoding="utf-8"?>
+<p:sld xmlns:a="http://schemas.openxmlformats.org/drawingml/2006/main" xmlns:r="http://schemas.openxmlformats.org/officeDocument/2006/relationships" xmlns:p="http://schemas.openxmlformats.org/presentationml/2006/main">
+  <p:cSld>
+    <p:spTree>
+      <p:nvGrpSpPr>
+        <p:cNvPr id="1" name=""/>
+        <p:cNvGrpSpPr/>
+        <p:nvPr/>
+      </p:nvGrpSpPr>
+      <p:grpSpPr>
+        <a:xfrm>
+          <a:off x="0" y="0"/>
+          <a:ext cx="0" cy="0"/>
+          <a:chOff x="0" y="0"/>
+          <a:chExt cx="0" cy="0"/>
+        </a:xfrm>
+      </p:grpSpPr>
+      <p:sp>
+        <p:nvSpPr>
+          <p:cNvPr id="2" name="Title 1"/>
+          <p:cNvSpPr>
+            <a:spLocks noGrp="1"/>
+          </p:cNvSpPr>
+          <p:nvPr>
+            <p:ph type="title"/>
+          </p:nvPr>
+        </p:nvSpPr>
+        <p:spPr/>
+        <p:txBody>
+          <a:bodyPr/>
+          <a:lstStyle/>
+          <a:p>
+            <a:r>
+              <a:rPr lang="en-US" dirty="0" smtClean="0"/>
+              <a:t>Web Client(Administrator View)</a:t>
+            </a:r>
+            <a:endParaRPr lang="en-US" dirty="0"/>
+          </a:p>
+        </p:txBody>
+      </p:sp>
+      <p:sp>
+        <p:nvSpPr>
+          <p:cNvPr id="3" name="Content Placeholder 2"/>
+          <p:cNvSpPr>
+            <a:spLocks noGrp="1"/>
+          </p:cNvSpPr>
+          <p:nvPr>
+            <p:ph idx="1"/>
+          </p:nvPr>
+        </p:nvSpPr>
+        <p:spPr/>
+        <p:txBody>
+          <a:bodyPr/>
+          <a:lstStyle/>
+          <a:p>
+            <a:r>
+              <a:rPr lang="en-CA" dirty="0"/>
+              <a:t>Written in </a:t>
+            </a:r>
+            <a:r>
+              <a:rPr lang="en-CA" dirty="0" smtClean="0"/>
+              <a:t>Python 3.2.1</a:t>
+            </a:r>
+            <a:endParaRPr lang="en-CA" dirty="0"/>
+          </a:p>
+          <a:p>
+            <a:r>
+              <a:rPr lang="en-CA" dirty="0" smtClean="0"/>
+              <a:t>Using HTML5/CSS3/</a:t>
+            </a:r>
+            <a:r>
+              <a:rPr lang="en-CA" dirty="0" err="1" smtClean="0"/>
+              <a:t>Jquery</a:t>
+            </a:r>
+            <a:r>
+              <a:rPr lang="en-CA" dirty="0"/>
+              <a:t> </a:t>
+            </a:r>
+            <a:r>
+              <a:rPr lang="en-CA" dirty="0" smtClean="0"/>
+              <a:t>for the user interface</a:t>
+            </a:r>
+            <a:endParaRPr lang="en-CA" dirty="0"/>
+          </a:p>
+          <a:p>
+            <a:r>
+              <a:rPr lang="en-CA" dirty="0" smtClean="0"/>
+              <a:t>Accessible from any computer using a modern browser in the local network</a:t>
+            </a:r>
+            <a:endParaRPr lang="en-CA" dirty="0"/>
+          </a:p>
+          <a:p>
+            <a:r>
+              <a:rPr lang="en-CA" dirty="0"/>
+              <a:t>SQLite 3 as a database </a:t>
+            </a:r>
+            <a:r>
+              <a:rPr lang="en-CA" dirty="0" smtClean="0"/>
+              <a:t>backend, same as user view.</a:t>
+            </a:r>
+            <a:endParaRPr lang="en-CA" dirty="0"/>
+          </a:p>
+          <a:p>
+            <a:r>
+              <a:rPr lang="en-CA" dirty="0" smtClean="0"/>
+              <a:t>Requires bottle.py (Web server)</a:t>
+            </a:r>
+          </a:p>
+          <a:p>
+            <a:r>
+              <a:rPr lang="en-CA" dirty="0" smtClean="0"/>
+              <a:t>Requires Chart.js(Chart generation)</a:t>
+            </a:r>
+            <a:endParaRPr lang="en-CA" dirty="0"/>
+          </a:p>
+          <a:p>
+            <a:r>
+              <a:rPr lang="en-CA" dirty="0" smtClean="0"/>
+              <a:t>Supports multiple simultaneous users.</a:t>
+            </a:r>
+          </a:p>
+          <a:p>
+            <a:endParaRPr lang="en-CA" dirty="0"/>
+          </a:p>
+          <a:p>
+            <a:pPr marL="0" indent="0">
+              <a:buNone/>
+            </a:pPr>
+            <a:endParaRPr lang="en-US" dirty="0"/>
+          </a:p>
+        </p:txBody>
+      </p:sp>
+    </p:spTree>
+    <p:extLst>
+      <p:ext uri="{BB962C8B-B14F-4D97-AF65-F5344CB8AC3E}">
+        <p14:creationId xmlns:p14="http://schemas.microsoft.com/office/powerpoint/2010/main" val="924568621"/>
       </p:ext>
     </p:extLst>
   </p:cSld>
@@ -13247,6 +14039,541 @@
     <p:extLst>
       <p:ext uri="{BB962C8B-B14F-4D97-AF65-F5344CB8AC3E}">
         <p14:creationId xmlns:p14="http://schemas.microsoft.com/office/powerpoint/2010/main" val="403081691"/>
+      </p:ext>
+    </p:extLst>
+  </p:cSld>
+  <p:clrMapOvr>
+    <a:masterClrMapping/>
+  </p:clrMapOvr>
+  <p:timing>
+    <p:tnLst>
+      <p:par>
+        <p:cTn id="1" dur="indefinite" restart="never" nodeType="tmRoot"/>
+      </p:par>
+    </p:tnLst>
+  </p:timing>
+</p:sld>
+</file>
+
+<file path=ppt/slides/slide30.xml><?xml version="1.0" encoding="utf-8"?>
+<p:sld xmlns:a="http://schemas.openxmlformats.org/drawingml/2006/main" xmlns:r="http://schemas.openxmlformats.org/officeDocument/2006/relationships" xmlns:p="http://schemas.openxmlformats.org/presentationml/2006/main">
+  <p:cSld>
+    <p:spTree>
+      <p:nvGrpSpPr>
+        <p:cNvPr id="1" name=""/>
+        <p:cNvGrpSpPr/>
+        <p:nvPr/>
+      </p:nvGrpSpPr>
+      <p:grpSpPr>
+        <a:xfrm>
+          <a:off x="0" y="0"/>
+          <a:ext cx="0" cy="0"/>
+          <a:chOff x="0" y="0"/>
+          <a:chExt cx="0" cy="0"/>
+        </a:xfrm>
+      </p:grpSpPr>
+      <p:sp>
+        <p:nvSpPr>
+          <p:cNvPr id="2" name="Title 1"/>
+          <p:cNvSpPr>
+            <a:spLocks noGrp="1"/>
+          </p:cNvSpPr>
+          <p:nvPr>
+            <p:ph type="title"/>
+          </p:nvPr>
+        </p:nvSpPr>
+        <p:spPr/>
+        <p:txBody>
+          <a:bodyPr/>
+          <a:lstStyle/>
+          <a:p>
+            <a:r>
+              <a:rPr lang="en-US" dirty="0" smtClean="0"/>
+              <a:t>Webclient.py</a:t>
+            </a:r>
+            <a:endParaRPr lang="en-US" dirty="0"/>
+          </a:p>
+        </p:txBody>
+      </p:sp>
+      <p:sp>
+        <p:nvSpPr>
+          <p:cNvPr id="3" name="Content Placeholder 2"/>
+          <p:cNvSpPr>
+            <a:spLocks noGrp="1"/>
+          </p:cNvSpPr>
+          <p:nvPr>
+            <p:ph idx="1"/>
+          </p:nvPr>
+        </p:nvSpPr>
+        <p:spPr/>
+        <p:txBody>
+          <a:bodyPr/>
+          <a:lstStyle/>
+          <a:p>
+            <a:r>
+              <a:rPr lang="en-US" dirty="0" smtClean="0"/>
+              <a:t>Uses Bottle.py, a micro webserver framework, which actually hosts and serves the actual files.</a:t>
+            </a:r>
+          </a:p>
+          <a:p>
+            <a:r>
+              <a:rPr lang="en-US" dirty="0" smtClean="0"/>
+              <a:t>Uses a templating system which returns pre-formatted HTML, and passes it variables to populate real-time data.</a:t>
+            </a:r>
+          </a:p>
+          <a:p>
+            <a:r>
+              <a:rPr lang="en-US" dirty="0" smtClean="0"/>
+              <a:t>Handles all get/post requests.</a:t>
+            </a:r>
+          </a:p>
+          <a:p>
+            <a:r>
+              <a:rPr lang="en-US" dirty="0" smtClean="0"/>
+              <a:t>Also does some small computations on data before it is passed on to the templates for visual representation(for example, it determines the ratio of day to night shifts)</a:t>
+            </a:r>
+            <a:endParaRPr lang="en-US" dirty="0"/>
+          </a:p>
+        </p:txBody>
+      </p:sp>
+    </p:spTree>
+    <p:extLst>
+      <p:ext uri="{BB962C8B-B14F-4D97-AF65-F5344CB8AC3E}">
+        <p14:creationId xmlns:p14="http://schemas.microsoft.com/office/powerpoint/2010/main" val="3333399972"/>
+      </p:ext>
+    </p:extLst>
+  </p:cSld>
+  <p:clrMapOvr>
+    <a:masterClrMapping/>
+  </p:clrMapOvr>
+  <p:timing>
+    <p:tnLst>
+      <p:par>
+        <p:cTn id="1" dur="indefinite" restart="never" nodeType="tmRoot"/>
+      </p:par>
+    </p:tnLst>
+  </p:timing>
+</p:sld>
+</file>
+
+<file path=ppt/slides/slide31.xml><?xml version="1.0" encoding="utf-8"?>
+<p:sld xmlns:a="http://schemas.openxmlformats.org/drawingml/2006/main" xmlns:r="http://schemas.openxmlformats.org/officeDocument/2006/relationships" xmlns:p="http://schemas.openxmlformats.org/presentationml/2006/main">
+  <p:cSld>
+    <p:spTree>
+      <p:nvGrpSpPr>
+        <p:cNvPr id="1" name=""/>
+        <p:cNvGrpSpPr/>
+        <p:nvPr/>
+      </p:nvGrpSpPr>
+      <p:grpSpPr>
+        <a:xfrm>
+          <a:off x="0" y="0"/>
+          <a:ext cx="0" cy="0"/>
+          <a:chOff x="0" y="0"/>
+          <a:chExt cx="0" cy="0"/>
+        </a:xfrm>
+      </p:grpSpPr>
+      <p:sp>
+        <p:nvSpPr>
+          <p:cNvPr id="2" name="Title 1"/>
+          <p:cNvSpPr>
+            <a:spLocks noGrp="1"/>
+          </p:cNvSpPr>
+          <p:nvPr>
+            <p:ph type="title"/>
+          </p:nvPr>
+        </p:nvSpPr>
+        <p:spPr/>
+        <p:txBody>
+          <a:bodyPr/>
+          <a:lstStyle/>
+          <a:p>
+            <a:r>
+              <a:rPr lang="en-US" dirty="0" smtClean="0"/>
+              <a:t>Templates</a:t>
+            </a:r>
+            <a:endParaRPr lang="en-US" dirty="0"/>
+          </a:p>
+        </p:txBody>
+      </p:sp>
+      <p:sp>
+        <p:nvSpPr>
+          <p:cNvPr id="3" name="Content Placeholder 2"/>
+          <p:cNvSpPr>
+            <a:spLocks noGrp="1"/>
+          </p:cNvSpPr>
+          <p:nvPr>
+            <p:ph idx="1"/>
+          </p:nvPr>
+        </p:nvSpPr>
+        <p:spPr>
+          <a:xfrm>
+            <a:off x="2823003" y="2145943"/>
+            <a:ext cx="1795179" cy="1396924"/>
+          </a:xfrm>
+        </p:spPr>
+        <p:txBody>
+          <a:bodyPr/>
+          <a:lstStyle/>
+          <a:p>
+            <a:pPr marL="0" indent="0">
+              <a:buNone/>
+            </a:pPr>
+            <a:r>
+              <a:rPr lang="en-US" dirty="0" smtClean="0"/>
+              <a:t>Webclient.py</a:t>
+            </a:r>
+            <a:endParaRPr lang="en-US" dirty="0"/>
+          </a:p>
+        </p:txBody>
+      </p:sp>
+      <p:pic>
+        <p:nvPicPr>
+          <p:cNvPr id="4" name="Picture 3"/>
+          <p:cNvPicPr>
+            <a:picLocks noChangeAspect="1"/>
+          </p:cNvPicPr>
+          <p:nvPr/>
+        </p:nvPicPr>
+        <p:blipFill>
+          <a:blip r:embed="rId2"/>
+          <a:stretch>
+            <a:fillRect/>
+          </a:stretch>
+        </p:blipFill>
+        <p:spPr>
+          <a:xfrm>
+            <a:off x="810000" y="3181281"/>
+            <a:ext cx="6372280" cy="1871010"/>
+          </a:xfrm>
+          <a:prstGeom prst="rect">
+            <a:avLst/>
+          </a:prstGeom>
+        </p:spPr>
+      </p:pic>
+      <p:pic>
+        <p:nvPicPr>
+          <p:cNvPr id="5" name="Picture 4"/>
+          <p:cNvPicPr>
+            <a:picLocks noChangeAspect="1"/>
+          </p:cNvPicPr>
+          <p:nvPr/>
+        </p:nvPicPr>
+        <p:blipFill>
+          <a:blip r:embed="rId3"/>
+          <a:stretch>
+            <a:fillRect/>
+          </a:stretch>
+        </p:blipFill>
+        <p:spPr>
+          <a:xfrm>
+            <a:off x="7370524" y="3181281"/>
+            <a:ext cx="4564301" cy="2503450"/>
+          </a:xfrm>
+          <a:prstGeom prst="rect">
+            <a:avLst/>
+          </a:prstGeom>
+        </p:spPr>
+      </p:pic>
+      <p:sp>
+        <p:nvSpPr>
+          <p:cNvPr id="6" name="Rectangle 5"/>
+          <p:cNvSpPr/>
+          <p:nvPr/>
+        </p:nvSpPr>
+        <p:spPr>
+          <a:xfrm>
+            <a:off x="8885477" y="2659739"/>
+            <a:ext cx="1534394" cy="369332"/>
+          </a:xfrm>
+          <a:prstGeom prst="rect">
+            <a:avLst/>
+          </a:prstGeom>
+        </p:spPr>
+        <p:txBody>
+          <a:bodyPr wrap="none">
+            <a:spAutoFit/>
+          </a:bodyPr>
+          <a:lstStyle/>
+          <a:p>
+            <a:r>
+              <a:rPr lang="en-US" dirty="0" err="1" smtClean="0"/>
+              <a:t>Analytics.tpl</a:t>
+            </a:r>
+            <a:endParaRPr lang="en-US" dirty="0"/>
+          </a:p>
+        </p:txBody>
+      </p:sp>
+    </p:spTree>
+    <p:extLst>
+      <p:ext uri="{BB962C8B-B14F-4D97-AF65-F5344CB8AC3E}">
+        <p14:creationId xmlns:p14="http://schemas.microsoft.com/office/powerpoint/2010/main" val="911467331"/>
+      </p:ext>
+    </p:extLst>
+  </p:cSld>
+  <p:clrMapOvr>
+    <a:masterClrMapping/>
+  </p:clrMapOvr>
+  <p:timing>
+    <p:tnLst>
+      <p:par>
+        <p:cTn id="1" dur="indefinite" restart="never" nodeType="tmRoot"/>
+      </p:par>
+    </p:tnLst>
+  </p:timing>
+</p:sld>
+</file>
+
+<file path=ppt/slides/slide32.xml><?xml version="1.0" encoding="utf-8"?>
+<p:sld xmlns:a="http://schemas.openxmlformats.org/drawingml/2006/main" xmlns:r="http://schemas.openxmlformats.org/officeDocument/2006/relationships" xmlns:p="http://schemas.openxmlformats.org/presentationml/2006/main">
+  <p:cSld>
+    <p:spTree>
+      <p:nvGrpSpPr>
+        <p:cNvPr id="1" name=""/>
+        <p:cNvGrpSpPr/>
+        <p:nvPr/>
+      </p:nvGrpSpPr>
+      <p:grpSpPr>
+        <a:xfrm>
+          <a:off x="0" y="0"/>
+          <a:ext cx="0" cy="0"/>
+          <a:chOff x="0" y="0"/>
+          <a:chExt cx="0" cy="0"/>
+        </a:xfrm>
+      </p:grpSpPr>
+      <p:sp>
+        <p:nvSpPr>
+          <p:cNvPr id="2" name="Title 1"/>
+          <p:cNvSpPr>
+            <a:spLocks noGrp="1"/>
+          </p:cNvSpPr>
+          <p:nvPr>
+            <p:ph type="title"/>
+          </p:nvPr>
+        </p:nvSpPr>
+        <p:spPr/>
+        <p:txBody>
+          <a:bodyPr/>
+          <a:lstStyle/>
+          <a:p>
+            <a:r>
+              <a:rPr lang="en-US" dirty="0" smtClean="0"/>
+              <a:t>Populator.py</a:t>
+            </a:r>
+            <a:endParaRPr lang="en-US" dirty="0"/>
+          </a:p>
+        </p:txBody>
+      </p:sp>
+      <p:sp>
+        <p:nvSpPr>
+          <p:cNvPr id="3" name="Content Placeholder 2"/>
+          <p:cNvSpPr>
+            <a:spLocks noGrp="1"/>
+          </p:cNvSpPr>
+          <p:nvPr>
+            <p:ph idx="1"/>
+          </p:nvPr>
+        </p:nvSpPr>
+        <p:spPr/>
+        <p:txBody>
+          <a:bodyPr/>
+          <a:lstStyle/>
+          <a:p>
+            <a:r>
+              <a:rPr lang="en-US" dirty="0" smtClean="0"/>
+              <a:t>Generates 300 randomized records at a time in the T_SHIFTS table.</a:t>
+            </a:r>
+            <a:endParaRPr lang="en-US" dirty="0"/>
+          </a:p>
+        </p:txBody>
+      </p:sp>
+    </p:spTree>
+    <p:extLst>
+      <p:ext uri="{BB962C8B-B14F-4D97-AF65-F5344CB8AC3E}">
+        <p14:creationId xmlns:p14="http://schemas.microsoft.com/office/powerpoint/2010/main" val="4242991845"/>
+      </p:ext>
+    </p:extLst>
+  </p:cSld>
+  <p:clrMapOvr>
+    <a:masterClrMapping/>
+  </p:clrMapOvr>
+  <p:timing>
+    <p:tnLst>
+      <p:par>
+        <p:cTn id="1" dur="indefinite" restart="never" nodeType="tmRoot"/>
+      </p:par>
+    </p:tnLst>
+  </p:timing>
+</p:sld>
+</file>
+
+<file path=ppt/slides/slide33.xml><?xml version="1.0" encoding="utf-8"?>
+<p:sld xmlns:a="http://schemas.openxmlformats.org/drawingml/2006/main" xmlns:r="http://schemas.openxmlformats.org/officeDocument/2006/relationships" xmlns:p="http://schemas.openxmlformats.org/presentationml/2006/main">
+  <p:cSld>
+    <p:spTree>
+      <p:nvGrpSpPr>
+        <p:cNvPr id="1" name=""/>
+        <p:cNvGrpSpPr/>
+        <p:nvPr/>
+      </p:nvGrpSpPr>
+      <p:grpSpPr>
+        <a:xfrm>
+          <a:off x="0" y="0"/>
+          <a:ext cx="0" cy="0"/>
+          <a:chOff x="0" y="0"/>
+          <a:chExt cx="0" cy="0"/>
+        </a:xfrm>
+      </p:grpSpPr>
+      <p:sp>
+        <p:nvSpPr>
+          <p:cNvPr id="2" name="Title 1"/>
+          <p:cNvSpPr>
+            <a:spLocks noGrp="1"/>
+          </p:cNvSpPr>
+          <p:nvPr>
+            <p:ph type="title"/>
+          </p:nvPr>
+        </p:nvSpPr>
+        <p:spPr/>
+        <p:txBody>
+          <a:bodyPr/>
+          <a:lstStyle/>
+          <a:p>
+            <a:r>
+              <a:rPr lang="en-CA" dirty="0" smtClean="0"/>
+              <a:t>Version Control</a:t>
+            </a:r>
+            <a:endParaRPr lang="en-CA" dirty="0"/>
+          </a:p>
+        </p:txBody>
+      </p:sp>
+      <p:sp>
+        <p:nvSpPr>
+          <p:cNvPr id="10" name="Content Placeholder 9"/>
+          <p:cNvSpPr>
+            <a:spLocks noGrp="1"/>
+          </p:cNvSpPr>
+          <p:nvPr>
+            <p:ph sz="half" idx="2"/>
+          </p:nvPr>
+        </p:nvSpPr>
+        <p:spPr>
+          <a:xfrm>
+            <a:off x="814729" y="2351314"/>
+            <a:ext cx="5189856" cy="3509737"/>
+          </a:xfrm>
+        </p:spPr>
+        <p:txBody>
+          <a:bodyPr/>
+          <a:lstStyle/>
+          <a:p>
+            <a:r>
+              <a:rPr lang="en-CA" dirty="0" err="1" smtClean="0"/>
+              <a:t>GitHub</a:t>
+            </a:r>
+            <a:r>
+              <a:rPr lang="en-CA" dirty="0" smtClean="0"/>
+              <a:t> allowed the programmers to download, update, sync and merge the source</a:t>
+            </a:r>
+          </a:p>
+          <a:p>
+            <a:r>
+              <a:rPr lang="en-CA" dirty="0" smtClean="0"/>
+              <a:t>No worries about outdated source code</a:t>
+            </a:r>
+          </a:p>
+          <a:p>
+            <a:r>
+              <a:rPr lang="en-CA" dirty="0" smtClean="0"/>
+              <a:t>Automatic reversion history, rollback at any time</a:t>
+            </a:r>
+          </a:p>
+          <a:p>
+            <a:r>
+              <a:rPr lang="en-CA" dirty="0" smtClean="0"/>
+              <a:t>Issue creation and tracking</a:t>
+            </a:r>
+          </a:p>
+          <a:p>
+            <a:r>
+              <a:rPr lang="en-CA" dirty="0" err="1" smtClean="0"/>
+              <a:t>GitHub</a:t>
+            </a:r>
+            <a:r>
+              <a:rPr lang="en-CA" dirty="0" smtClean="0"/>
+              <a:t> is </a:t>
+            </a:r>
+            <a:r>
+              <a:rPr lang="en-CA" dirty="0" smtClean="0"/>
+              <a:t>great - </a:t>
+            </a:r>
+            <a:r>
+              <a:rPr lang="en-CA" dirty="0" smtClean="0"/>
+              <a:t>use it</a:t>
+            </a:r>
+          </a:p>
+        </p:txBody>
+      </p:sp>
+      <p:sp>
+        <p:nvSpPr>
+          <p:cNvPr id="11" name="Text Placeholder 10"/>
+          <p:cNvSpPr>
+            <a:spLocks noGrp="1"/>
+          </p:cNvSpPr>
+          <p:nvPr>
+            <p:ph type="body" sz="quarter" idx="3"/>
+          </p:nvPr>
+        </p:nvSpPr>
+        <p:spPr/>
+        <p:txBody>
+          <a:bodyPr/>
+          <a:lstStyle/>
+          <a:p>
+            <a:r>
+              <a:rPr lang="en-CA" dirty="0" smtClean="0"/>
+              <a:t>Git implemented by </a:t>
+            </a:r>
+            <a:r>
+              <a:rPr lang="en-CA" dirty="0" err="1" smtClean="0"/>
+              <a:t>GitHub</a:t>
+            </a:r>
+            <a:endParaRPr lang="en-CA" dirty="0"/>
+          </a:p>
+        </p:txBody>
+      </p:sp>
+      <p:pic>
+        <p:nvPicPr>
+          <p:cNvPr id="13" name="Content Placeholder 12"/>
+          <p:cNvPicPr>
+            <a:picLocks noGrp="1" noChangeAspect="1"/>
+          </p:cNvPicPr>
+          <p:nvPr>
+            <p:ph sz="quarter" idx="4"/>
+          </p:nvPr>
+        </p:nvPicPr>
+        <p:blipFill>
+          <a:blip r:embed="rId2">
+            <a:extLst>
+              <a:ext uri="{28A0092B-C50C-407E-A947-70E740481C1C}">
+                <a14:useLocalDpi xmlns:a14="http://schemas.microsoft.com/office/drawing/2010/main" val="0"/>
+              </a:ext>
+            </a:extLst>
+          </a:blip>
+          <a:stretch>
+            <a:fillRect/>
+          </a:stretch>
+        </p:blipFill>
+        <p:spPr>
+          <a:xfrm>
+            <a:off x="7261225" y="3634581"/>
+            <a:ext cx="3048000" cy="1343025"/>
+          </a:xfrm>
+        </p:spPr>
+      </p:pic>
+    </p:spTree>
+    <p:extLst>
+      <p:ext uri="{BB962C8B-B14F-4D97-AF65-F5344CB8AC3E}">
+        <p14:creationId xmlns:p14="http://schemas.microsoft.com/office/powerpoint/2010/main" val="1675094306"/>
       </p:ext>
     </p:extLst>
   </p:cSld>
@@ -13389,25 +14716,6 @@
               <a:t> Goal</a:t>
             </a:r>
             <a:endParaRPr lang="en-CA" dirty="0"/>
-          </a:p>
-        </p:txBody>
-      </p:sp>
-      <p:sp>
-        <p:nvSpPr>
-          <p:cNvPr id="5" name="Text Placeholder 4"/>
-          <p:cNvSpPr>
-            <a:spLocks noGrp="1"/>
-          </p:cNvSpPr>
-          <p:nvPr>
-            <p:ph type="body" idx="1"/>
-          </p:nvPr>
-        </p:nvSpPr>
-        <p:spPr/>
-        <p:txBody>
-          <a:bodyPr/>
-          <a:lstStyle/>
-          <a:p>
-            <a:endParaRPr lang="en-CA"/>
           </a:p>
         </p:txBody>
       </p:sp>

</xml_diff>